<commit_message>
Added lab programs of String operations
</commit_message>
<xml_diff>
--- a/THEORY/MODULE_2/MODULE2.pptx
+++ b/THEORY/MODULE_2/MODULE2.pptx
@@ -24,6 +24,7 @@
     <p:sldId id="273" r:id="rId18"/>
     <p:sldId id="274" r:id="rId19"/>
     <p:sldId id="275" r:id="rId20"/>
+    <p:sldId id="276" r:id="rId21"/>
   </p:sldIdLst>
   <p:sldSz cx="12192000" cy="6858000"/>
   <p:notesSz cx="6858000" cy="9144000"/>
@@ -143,7 +144,7 @@
   <pc:docChgLst>
     <pc:chgData name="Anugraha Shaju" userId="71a259dc963d91c3" providerId="LiveId" clId="{760CD989-CD68-488E-9730-D08BF003E4FB}"/>
     <pc:docChg chg="undo custSel addSld delSld modSld sldOrd">
-      <pc:chgData name="Anugraha Shaju" userId="71a259dc963d91c3" providerId="LiveId" clId="{760CD989-CD68-488E-9730-D08BF003E4FB}" dt="2025-09-11T09:20:03.624" v="481" actId="313"/>
+      <pc:chgData name="Anugraha Shaju" userId="71a259dc963d91c3" providerId="LiveId" clId="{760CD989-CD68-488E-9730-D08BF003E4FB}" dt="2025-09-11T09:27:27.634" v="486" actId="207"/>
       <pc:docMkLst>
         <pc:docMk/>
       </pc:docMkLst>
@@ -395,6 +396,21 @@
             <pc:docMk/>
             <pc:sldMk cId="439685860" sldId="275"/>
             <ac:spMk id="3" creationId="{56397864-150F-3411-3F9E-747806EF93FF}"/>
+          </ac:spMkLst>
+        </pc:spChg>
+      </pc:sldChg>
+      <pc:sldChg chg="modSp add mod ord">
+        <pc:chgData name="Anugraha Shaju" userId="71a259dc963d91c3" providerId="LiveId" clId="{760CD989-CD68-488E-9730-D08BF003E4FB}" dt="2025-09-11T09:27:27.634" v="486" actId="207"/>
+        <pc:sldMkLst>
+          <pc:docMk/>
+          <pc:sldMk cId="1921615921" sldId="276"/>
+        </pc:sldMkLst>
+        <pc:spChg chg="mod">
+          <ac:chgData name="Anugraha Shaju" userId="71a259dc963d91c3" providerId="LiveId" clId="{760CD989-CD68-488E-9730-D08BF003E4FB}" dt="2025-09-11T09:27:27.634" v="486" actId="207"/>
+          <ac:spMkLst>
+            <pc:docMk/>
+            <pc:sldMk cId="1921615921" sldId="276"/>
+            <ac:spMk id="3" creationId="{CFD2C0DF-F7BC-8729-2930-5C1165E77464}"/>
           </ac:spMkLst>
         </pc:spChg>
       </pc:sldChg>
@@ -5654,6 +5670,155 @@
     <p:extLst>
       <p:ext uri="{BB962C8B-B14F-4D97-AF65-F5344CB8AC3E}">
         <p14:creationId xmlns:p14="http://schemas.microsoft.com/office/powerpoint/2010/main" val="1764399388"/>
+      </p:ext>
+    </p:extLst>
+  </p:cSld>
+  <p:clrMapOvr>
+    <a:masterClrMapping/>
+  </p:clrMapOvr>
+</p:sld>
+</file>
+
+<file path=ppt/slides/slide20.xml><?xml version="1.0" encoding="utf-8"?>
+<p:sld xmlns:a="http://schemas.openxmlformats.org/drawingml/2006/main" xmlns:r="http://schemas.openxmlformats.org/officeDocument/2006/relationships" xmlns:p="http://schemas.openxmlformats.org/presentationml/2006/main">
+  <p:cSld>
+    <p:spTree>
+      <p:nvGrpSpPr>
+        <p:cNvPr id="1" name="">
+          <a:extLst>
+            <a:ext uri="{FF2B5EF4-FFF2-40B4-BE49-F238E27FC236}">
+              <a16:creationId xmlns:a16="http://schemas.microsoft.com/office/drawing/2014/main" id="{4F781140-F5AE-0546-7E17-8640A4B22960}"/>
+            </a:ext>
+          </a:extLst>
+        </p:cNvPr>
+        <p:cNvGrpSpPr/>
+        <p:nvPr/>
+      </p:nvGrpSpPr>
+      <p:grpSpPr>
+        <a:xfrm>
+          <a:off x="0" y="0"/>
+          <a:ext cx="0" cy="0"/>
+          <a:chOff x="0" y="0"/>
+          <a:chExt cx="0" cy="0"/>
+        </a:xfrm>
+      </p:grpSpPr>
+      <p:sp>
+        <p:nvSpPr>
+          <p:cNvPr id="2" name="Title 1">
+            <a:extLst>
+              <a:ext uri="{FF2B5EF4-FFF2-40B4-BE49-F238E27FC236}">
+                <a16:creationId xmlns:a16="http://schemas.microsoft.com/office/drawing/2014/main" id="{0308CA2A-8F7E-ABBF-B17A-2A102FEA21A6}"/>
+              </a:ext>
+            </a:extLst>
+          </p:cNvPr>
+          <p:cNvSpPr>
+            <a:spLocks noGrp="1"/>
+          </p:cNvSpPr>
+          <p:nvPr>
+            <p:ph type="ctrTitle"/>
+          </p:nvPr>
+        </p:nvSpPr>
+        <p:spPr>
+          <a:xfrm>
+            <a:off x="1809135" y="1041400"/>
+            <a:ext cx="9144000" cy="2387600"/>
+          </a:xfrm>
+        </p:spPr>
+        <p:txBody>
+          <a:bodyPr/>
+          <a:lstStyle/>
+          <a:p>
+            <a:r>
+              <a:rPr lang="en-US" dirty="0">
+                <a:solidFill>
+                  <a:srgbClr val="FF0000"/>
+                </a:solidFill>
+                <a:latin typeface="Times New Roman" panose="02020603050405020304" pitchFamily="18" charset="0"/>
+                <a:cs typeface="Times New Roman" panose="02020603050405020304" pitchFamily="18" charset="0"/>
+              </a:rPr>
+              <a:t>PROGRAMMING IN C	</a:t>
+            </a:r>
+            <a:endParaRPr lang="en-IN" dirty="0">
+              <a:solidFill>
+                <a:srgbClr val="FF0000"/>
+              </a:solidFill>
+              <a:latin typeface="Times New Roman" panose="02020603050405020304" pitchFamily="18" charset="0"/>
+              <a:cs typeface="Times New Roman" panose="02020603050405020304" pitchFamily="18" charset="0"/>
+            </a:endParaRPr>
+          </a:p>
+        </p:txBody>
+      </p:sp>
+      <p:sp>
+        <p:nvSpPr>
+          <p:cNvPr id="3" name="Subtitle 2">
+            <a:extLst>
+              <a:ext uri="{FF2B5EF4-FFF2-40B4-BE49-F238E27FC236}">
+                <a16:creationId xmlns:a16="http://schemas.microsoft.com/office/drawing/2014/main" id="{CFD2C0DF-F7BC-8729-2930-5C1165E77464}"/>
+              </a:ext>
+            </a:extLst>
+          </p:cNvPr>
+          <p:cNvSpPr>
+            <a:spLocks noGrp="1"/>
+          </p:cNvSpPr>
+          <p:nvPr>
+            <p:ph type="subTitle" idx="1"/>
+          </p:nvPr>
+        </p:nvSpPr>
+        <p:spPr>
+          <a:xfrm>
+            <a:off x="614516" y="3429000"/>
+            <a:ext cx="10962967" cy="1854865"/>
+          </a:xfrm>
+        </p:spPr>
+        <p:txBody>
+          <a:bodyPr>
+            <a:normAutofit fontScale="85000" lnSpcReduction="20000"/>
+          </a:bodyPr>
+          <a:lstStyle/>
+          <a:p>
+            <a:r>
+              <a:rPr lang="en-US" dirty="0"/>
+              <a:t>MODULE 2</a:t>
+            </a:r>
+          </a:p>
+          <a:p>
+            <a:pPr algn="just"/>
+            <a:r>
+              <a:rPr lang="en-US" dirty="0"/>
+              <a:t>Summarize the definition, initialization and accessing of single and multi dimensional arrays, Develop programs using single and multidimensional arrays, Illustrate the concept of divide and conquer method in solving problems, Develop C programs to implement searching (linear search and binary search) and sorting (selection sort and quicksort) algorithms. </a:t>
+            </a:r>
+            <a:r>
+              <a:rPr lang="en-US" dirty="0">
+                <a:solidFill>
+                  <a:srgbClr val="00B050"/>
+                </a:solidFill>
+              </a:rPr>
+              <a:t>Explain the representation of strings in C</a:t>
+            </a:r>
+            <a:r>
+              <a:rPr lang="en-US" dirty="0">
+                <a:solidFill>
+                  <a:schemeClr val="bg2">
+                    <a:lumMod val="10000"/>
+                  </a:schemeClr>
+                </a:solidFill>
+              </a:rPr>
+              <a:t>, Develop C programs to perform different operations on strings, Illustrate passing arrays as parameters to a function.</a:t>
+            </a:r>
+            <a:endParaRPr lang="en-IN" dirty="0">
+              <a:solidFill>
+                <a:schemeClr val="bg2">
+                  <a:lumMod val="10000"/>
+                </a:schemeClr>
+              </a:solidFill>
+            </a:endParaRPr>
+          </a:p>
+        </p:txBody>
+      </p:sp>
+    </p:spTree>
+    <p:extLst>
+      <p:ext uri="{BB962C8B-B14F-4D97-AF65-F5344CB8AC3E}">
+        <p14:creationId xmlns:p14="http://schemas.microsoft.com/office/powerpoint/2010/main" val="1921615921"/>
       </p:ext>
     </p:extLst>
   </p:cSld>

</xml_diff>

<commit_message>
added module 3 in teh theory part and added some lab programs of string operations
</commit_message>
<xml_diff>
--- a/THEORY/MODULE_2/MODULE2.pptx
+++ b/THEORY/MODULE_2/MODULE2.pptx
@@ -25,6 +25,8 @@
     <p:sldId id="274" r:id="rId19"/>
     <p:sldId id="275" r:id="rId20"/>
     <p:sldId id="276" r:id="rId21"/>
+    <p:sldId id="277" r:id="rId22"/>
+    <p:sldId id="278" r:id="rId23"/>
   </p:sldIdLst>
   <p:sldSz cx="12192000" cy="6858000"/>
   <p:notesSz cx="6858000" cy="9144000"/>
@@ -134,7 +136,7 @@
 <file path=ppt/revisionInfo.xml><?xml version="1.0" encoding="utf-8"?>
 <p1510:revInfo xmlns:a="http://schemas.openxmlformats.org/drawingml/2006/main" xmlns:r="http://schemas.openxmlformats.org/officeDocument/2006/relationships" xmlns:p1510="http://schemas.microsoft.com/office/powerpoint/2015/10/main">
   <p1510:revLst>
-    <p1510:client id="{26CE66B5-9B85-49BD-BEC5-B66D43C69D2B}" v="41" dt="2025-09-11T09:17:28.238"/>
+    <p1510:client id="{26CE66B5-9B85-49BD-BEC5-B66D43C69D2B}" v="54" dt="2025-09-12T10:00:38.853"/>
   </p1510:revLst>
 </p1510:revInfo>
 </file>
@@ -144,7 +146,7 @@
   <pc:docChgLst>
     <pc:chgData name="Anugraha Shaju" userId="71a259dc963d91c3" providerId="LiveId" clId="{760CD989-CD68-488E-9730-D08BF003E4FB}"/>
     <pc:docChg chg="undo custSel addSld delSld modSld sldOrd">
-      <pc:chgData name="Anugraha Shaju" userId="71a259dc963d91c3" providerId="LiveId" clId="{760CD989-CD68-488E-9730-D08BF003E4FB}" dt="2025-09-11T09:27:27.634" v="486" actId="207"/>
+      <pc:chgData name="Anugraha Shaju" userId="71a259dc963d91c3" providerId="LiveId" clId="{760CD989-CD68-488E-9730-D08BF003E4FB}" dt="2025-09-12T10:12:06.531" v="780" actId="207"/>
       <pc:docMkLst>
         <pc:docMk/>
       </pc:docMkLst>
@@ -377,13 +379,13 @@
         </pc:spChg>
       </pc:sldChg>
       <pc:sldChg chg="modSp new mod ord">
-        <pc:chgData name="Anugraha Shaju" userId="71a259dc963d91c3" providerId="LiveId" clId="{760CD989-CD68-488E-9730-D08BF003E4FB}" dt="2025-09-11T09:20:03.624" v="481" actId="313"/>
+        <pc:chgData name="Anugraha Shaju" userId="71a259dc963d91c3" providerId="LiveId" clId="{760CD989-CD68-488E-9730-D08BF003E4FB}" dt="2025-09-12T09:40:07.544" v="502" actId="2711"/>
         <pc:sldMkLst>
           <pc:docMk/>
           <pc:sldMk cId="439685860" sldId="275"/>
         </pc:sldMkLst>
         <pc:spChg chg="mod">
-          <ac:chgData name="Anugraha Shaju" userId="71a259dc963d91c3" providerId="LiveId" clId="{760CD989-CD68-488E-9730-D08BF003E4FB}" dt="2025-09-11T09:15:39.783" v="398" actId="122"/>
+          <ac:chgData name="Anugraha Shaju" userId="71a259dc963d91c3" providerId="LiveId" clId="{760CD989-CD68-488E-9730-D08BF003E4FB}" dt="2025-09-12T09:40:07.544" v="502" actId="2711"/>
           <ac:spMkLst>
             <pc:docMk/>
             <pc:sldMk cId="439685860" sldId="275"/>
@@ -400,17 +402,71 @@
         </pc:spChg>
       </pc:sldChg>
       <pc:sldChg chg="modSp add mod ord">
-        <pc:chgData name="Anugraha Shaju" userId="71a259dc963d91c3" providerId="LiveId" clId="{760CD989-CD68-488E-9730-D08BF003E4FB}" dt="2025-09-11T09:27:27.634" v="486" actId="207"/>
+        <pc:chgData name="Anugraha Shaju" userId="71a259dc963d91c3" providerId="LiveId" clId="{760CD989-CD68-488E-9730-D08BF003E4FB}" dt="2025-09-12T10:12:06.531" v="780" actId="207"/>
         <pc:sldMkLst>
           <pc:docMk/>
           <pc:sldMk cId="1921615921" sldId="276"/>
         </pc:sldMkLst>
         <pc:spChg chg="mod">
-          <ac:chgData name="Anugraha Shaju" userId="71a259dc963d91c3" providerId="LiveId" clId="{760CD989-CD68-488E-9730-D08BF003E4FB}" dt="2025-09-11T09:27:27.634" v="486" actId="207"/>
+          <ac:chgData name="Anugraha Shaju" userId="71a259dc963d91c3" providerId="LiveId" clId="{760CD989-CD68-488E-9730-D08BF003E4FB}" dt="2025-09-12T10:12:06.531" v="780" actId="207"/>
           <ac:spMkLst>
             <pc:docMk/>
             <pc:sldMk cId="1921615921" sldId="276"/>
             <ac:spMk id="3" creationId="{CFD2C0DF-F7BC-8729-2930-5C1165E77464}"/>
+          </ac:spMkLst>
+        </pc:spChg>
+      </pc:sldChg>
+      <pc:sldChg chg="modSp new mod">
+        <pc:chgData name="Anugraha Shaju" userId="71a259dc963d91c3" providerId="LiveId" clId="{760CD989-CD68-488E-9730-D08BF003E4FB}" dt="2025-09-12T09:50:22.650" v="663" actId="2711"/>
+        <pc:sldMkLst>
+          <pc:docMk/>
+          <pc:sldMk cId="2128554438" sldId="277"/>
+        </pc:sldMkLst>
+        <pc:spChg chg="mod">
+          <ac:chgData name="Anugraha Shaju" userId="71a259dc963d91c3" providerId="LiveId" clId="{760CD989-CD68-488E-9730-D08BF003E4FB}" dt="2025-09-12T09:48:12.083" v="515" actId="113"/>
+          <ac:spMkLst>
+            <pc:docMk/>
+            <pc:sldMk cId="2128554438" sldId="277"/>
+            <ac:spMk id="2" creationId="{1EC6F273-FDA1-57CE-8DAB-4F45CEBF9322}"/>
+          </ac:spMkLst>
+        </pc:spChg>
+        <pc:spChg chg="mod">
+          <ac:chgData name="Anugraha Shaju" userId="71a259dc963d91c3" providerId="LiveId" clId="{760CD989-CD68-488E-9730-D08BF003E4FB}" dt="2025-09-12T09:50:22.650" v="663" actId="2711"/>
+          <ac:spMkLst>
+            <pc:docMk/>
+            <pc:sldMk cId="2128554438" sldId="277"/>
+            <ac:spMk id="3" creationId="{6DB22EC7-714F-95A5-85AC-47F8D33F4077}"/>
+          </ac:spMkLst>
+        </pc:spChg>
+      </pc:sldChg>
+      <pc:sldChg chg="addSp modSp new mod">
+        <pc:chgData name="Anugraha Shaju" userId="71a259dc963d91c3" providerId="LiveId" clId="{760CD989-CD68-488E-9730-D08BF003E4FB}" dt="2025-09-12T10:00:42.761" v="779" actId="20577"/>
+        <pc:sldMkLst>
+          <pc:docMk/>
+          <pc:sldMk cId="4091484088" sldId="278"/>
+        </pc:sldMkLst>
+        <pc:spChg chg="mod">
+          <ac:chgData name="Anugraha Shaju" userId="71a259dc963d91c3" providerId="LiveId" clId="{760CD989-CD68-488E-9730-D08BF003E4FB}" dt="2025-09-12T09:50:49.033" v="684" actId="2711"/>
+          <ac:spMkLst>
+            <pc:docMk/>
+            <pc:sldMk cId="4091484088" sldId="278"/>
+            <ac:spMk id="2" creationId="{889E51C0-F319-DDDD-5558-6231B7401330}"/>
+          </ac:spMkLst>
+        </pc:spChg>
+        <pc:spChg chg="mod">
+          <ac:chgData name="Anugraha Shaju" userId="71a259dc963d91c3" providerId="LiveId" clId="{760CD989-CD68-488E-9730-D08BF003E4FB}" dt="2025-09-12T10:00:21.923" v="763" actId="27636"/>
+          <ac:spMkLst>
+            <pc:docMk/>
+            <pc:sldMk cId="4091484088" sldId="278"/>
+            <ac:spMk id="3" creationId="{572B3CCE-3B40-B17A-EEAF-9824FB6FC29F}"/>
+          </ac:spMkLst>
+        </pc:spChg>
+        <pc:spChg chg="add mod">
+          <ac:chgData name="Anugraha Shaju" userId="71a259dc963d91c3" providerId="LiveId" clId="{760CD989-CD68-488E-9730-D08BF003E4FB}" dt="2025-09-12T10:00:42.761" v="779" actId="20577"/>
+          <ac:spMkLst>
+            <pc:docMk/>
+            <pc:sldMk cId="4091484088" sldId="278"/>
+            <ac:spMk id="4" creationId="{CD393931-C7B1-2029-C5A1-9389EE6141A5}"/>
           </ac:spMkLst>
         </pc:spChg>
       </pc:sldChg>
@@ -568,7 +624,7 @@
           <a:p>
             <a:fld id="{6684D319-E430-4CC1-BA6E-D22CC260F6C5}" type="datetimeFigureOut">
               <a:rPr lang="en-IN" smtClean="0"/>
-              <a:t>11-09-2025</a:t>
+              <a:t>12-09-2025</a:t>
             </a:fld>
             <a:endParaRPr lang="en-IN"/>
           </a:p>
@@ -768,7 +824,7 @@
           <a:p>
             <a:fld id="{6684D319-E430-4CC1-BA6E-D22CC260F6C5}" type="datetimeFigureOut">
               <a:rPr lang="en-IN" smtClean="0"/>
-              <a:t>11-09-2025</a:t>
+              <a:t>12-09-2025</a:t>
             </a:fld>
             <a:endParaRPr lang="en-IN"/>
           </a:p>
@@ -978,7 +1034,7 @@
           <a:p>
             <a:fld id="{6684D319-E430-4CC1-BA6E-D22CC260F6C5}" type="datetimeFigureOut">
               <a:rPr lang="en-IN" smtClean="0"/>
-              <a:t>11-09-2025</a:t>
+              <a:t>12-09-2025</a:t>
             </a:fld>
             <a:endParaRPr lang="en-IN"/>
           </a:p>
@@ -1178,7 +1234,7 @@
           <a:p>
             <a:fld id="{6684D319-E430-4CC1-BA6E-D22CC260F6C5}" type="datetimeFigureOut">
               <a:rPr lang="en-IN" smtClean="0"/>
-              <a:t>11-09-2025</a:t>
+              <a:t>12-09-2025</a:t>
             </a:fld>
             <a:endParaRPr lang="en-IN"/>
           </a:p>
@@ -1454,7 +1510,7 @@
           <a:p>
             <a:fld id="{6684D319-E430-4CC1-BA6E-D22CC260F6C5}" type="datetimeFigureOut">
               <a:rPr lang="en-IN" smtClean="0"/>
-              <a:t>11-09-2025</a:t>
+              <a:t>12-09-2025</a:t>
             </a:fld>
             <a:endParaRPr lang="en-IN"/>
           </a:p>
@@ -1722,7 +1778,7 @@
           <a:p>
             <a:fld id="{6684D319-E430-4CC1-BA6E-D22CC260F6C5}" type="datetimeFigureOut">
               <a:rPr lang="en-IN" smtClean="0"/>
-              <a:t>11-09-2025</a:t>
+              <a:t>12-09-2025</a:t>
             </a:fld>
             <a:endParaRPr lang="en-IN"/>
           </a:p>
@@ -2137,7 +2193,7 @@
           <a:p>
             <a:fld id="{6684D319-E430-4CC1-BA6E-D22CC260F6C5}" type="datetimeFigureOut">
               <a:rPr lang="en-IN" smtClean="0"/>
-              <a:t>11-09-2025</a:t>
+              <a:t>12-09-2025</a:t>
             </a:fld>
             <a:endParaRPr lang="en-IN"/>
           </a:p>
@@ -2279,7 +2335,7 @@
           <a:p>
             <a:fld id="{6684D319-E430-4CC1-BA6E-D22CC260F6C5}" type="datetimeFigureOut">
               <a:rPr lang="en-IN" smtClean="0"/>
-              <a:t>11-09-2025</a:t>
+              <a:t>12-09-2025</a:t>
             </a:fld>
             <a:endParaRPr lang="en-IN"/>
           </a:p>
@@ -2392,7 +2448,7 @@
           <a:p>
             <a:fld id="{6684D319-E430-4CC1-BA6E-D22CC260F6C5}" type="datetimeFigureOut">
               <a:rPr lang="en-IN" smtClean="0"/>
-              <a:t>11-09-2025</a:t>
+              <a:t>12-09-2025</a:t>
             </a:fld>
             <a:endParaRPr lang="en-IN"/>
           </a:p>
@@ -2705,7 +2761,7 @@
           <a:p>
             <a:fld id="{6684D319-E430-4CC1-BA6E-D22CC260F6C5}" type="datetimeFigureOut">
               <a:rPr lang="en-IN" smtClean="0"/>
-              <a:t>11-09-2025</a:t>
+              <a:t>12-09-2025</a:t>
             </a:fld>
             <a:endParaRPr lang="en-IN"/>
           </a:p>
@@ -2994,7 +3050,7 @@
           <a:p>
             <a:fld id="{6684D319-E430-4CC1-BA6E-D22CC260F6C5}" type="datetimeFigureOut">
               <a:rPr lang="en-IN" smtClean="0"/>
-              <a:t>11-09-2025</a:t>
+              <a:t>12-09-2025</a:t>
             </a:fld>
             <a:endParaRPr lang="en-IN"/>
           </a:p>
@@ -3237,7 +3293,7 @@
           <a:p>
             <a:fld id="{6684D319-E430-4CC1-BA6E-D22CC260F6C5}" type="datetimeFigureOut">
               <a:rPr lang="en-IN" smtClean="0"/>
-              <a:t>11-09-2025</a:t>
+              <a:t>12-09-2025</a:t>
             </a:fld>
             <a:endParaRPr lang="en-IN"/>
           </a:p>
@@ -5467,7 +5523,17 @@
           <a:lstStyle/>
           <a:p>
             <a:pPr algn="ctr"/>
-            <a:endParaRPr lang="en-IN" dirty="0"/>
+            <a:r>
+              <a:rPr lang="en-US" dirty="0">
+                <a:latin typeface="Times New Roman" panose="02020603050405020304" pitchFamily="18" charset="0"/>
+                <a:cs typeface="Times New Roman" panose="02020603050405020304" pitchFamily="18" charset="0"/>
+              </a:rPr>
+              <a:t>Passing Arrays </a:t>
+            </a:r>
+            <a:endParaRPr lang="en-IN" dirty="0">
+              <a:latin typeface="Times New Roman" panose="02020603050405020304" pitchFamily="18" charset="0"/>
+              <a:cs typeface="Times New Roman" panose="02020603050405020304" pitchFamily="18" charset="0"/>
+            </a:endParaRPr>
           </a:p>
         </p:txBody>
       </p:sp>
@@ -5803,7 +5869,25 @@
                   </a:schemeClr>
                 </a:solidFill>
               </a:rPr>
-              <a:t>, Develop C programs to perform different operations on strings, Illustrate passing arrays as parameters to a function.</a:t>
+              <a:t>, </a:t>
+            </a:r>
+            <a:r>
+              <a:rPr lang="en-US" dirty="0">
+                <a:solidFill>
+                  <a:srgbClr val="00B050"/>
+                </a:solidFill>
+              </a:rPr>
+              <a:t>Develop C programs to perform different operations on strings</a:t>
+            </a:r>
+            <a:r>
+              <a:rPr lang="en-US" dirty="0">
+                <a:solidFill>
+                  <a:schemeClr val="bg2">
+                    <a:lumMod val="10000"/>
+                  </a:schemeClr>
+                </a:solidFill>
+              </a:rPr>
+              <a:t>, Illustrate passing arrays as parameters to a function.</a:t>
             </a:r>
             <a:endParaRPr lang="en-IN" dirty="0">
               <a:solidFill>
@@ -5819,6 +5903,420 @@
     <p:extLst>
       <p:ext uri="{BB962C8B-B14F-4D97-AF65-F5344CB8AC3E}">
         <p14:creationId xmlns:p14="http://schemas.microsoft.com/office/powerpoint/2010/main" val="1921615921"/>
+      </p:ext>
+    </p:extLst>
+  </p:cSld>
+  <p:clrMapOvr>
+    <a:masterClrMapping/>
+  </p:clrMapOvr>
+</p:sld>
+</file>
+
+<file path=ppt/slides/slide21.xml><?xml version="1.0" encoding="utf-8"?>
+<p:sld xmlns:a="http://schemas.openxmlformats.org/drawingml/2006/main" xmlns:r="http://schemas.openxmlformats.org/officeDocument/2006/relationships" xmlns:p="http://schemas.openxmlformats.org/presentationml/2006/main">
+  <p:cSld>
+    <p:spTree>
+      <p:nvGrpSpPr>
+        <p:cNvPr id="1" name=""/>
+        <p:cNvGrpSpPr/>
+        <p:nvPr/>
+      </p:nvGrpSpPr>
+      <p:grpSpPr>
+        <a:xfrm>
+          <a:off x="0" y="0"/>
+          <a:ext cx="0" cy="0"/>
+          <a:chOff x="0" y="0"/>
+          <a:chExt cx="0" cy="0"/>
+        </a:xfrm>
+      </p:grpSpPr>
+      <p:sp>
+        <p:nvSpPr>
+          <p:cNvPr id="2" name="Title 1">
+            <a:extLst>
+              <a:ext uri="{FF2B5EF4-FFF2-40B4-BE49-F238E27FC236}">
+                <a16:creationId xmlns:a16="http://schemas.microsoft.com/office/drawing/2014/main" id="{1EC6F273-FDA1-57CE-8DAB-4F45CEBF9322}"/>
+              </a:ext>
+            </a:extLst>
+          </p:cNvPr>
+          <p:cNvSpPr>
+            <a:spLocks noGrp="1"/>
+          </p:cNvSpPr>
+          <p:nvPr>
+            <p:ph type="title"/>
+          </p:nvPr>
+        </p:nvSpPr>
+        <p:spPr/>
+        <p:txBody>
+          <a:bodyPr/>
+          <a:lstStyle/>
+          <a:p>
+            <a:pPr algn="ctr"/>
+            <a:r>
+              <a:rPr lang="en-US" b="1" dirty="0">
+                <a:latin typeface="Times New Roman" panose="02020603050405020304" pitchFamily="18" charset="0"/>
+                <a:cs typeface="Times New Roman" panose="02020603050405020304" pitchFamily="18" charset="0"/>
+              </a:rPr>
+              <a:t>String	</a:t>
+            </a:r>
+            <a:endParaRPr lang="en-IN" b="1" dirty="0">
+              <a:latin typeface="Times New Roman" panose="02020603050405020304" pitchFamily="18" charset="0"/>
+              <a:cs typeface="Times New Roman" panose="02020603050405020304" pitchFamily="18" charset="0"/>
+            </a:endParaRPr>
+          </a:p>
+        </p:txBody>
+      </p:sp>
+      <p:sp>
+        <p:nvSpPr>
+          <p:cNvPr id="3" name="Content Placeholder 2">
+            <a:extLst>
+              <a:ext uri="{FF2B5EF4-FFF2-40B4-BE49-F238E27FC236}">
+                <a16:creationId xmlns:a16="http://schemas.microsoft.com/office/drawing/2014/main" id="{6DB22EC7-714F-95A5-85AC-47F8D33F4077}"/>
+              </a:ext>
+            </a:extLst>
+          </p:cNvPr>
+          <p:cNvSpPr>
+            <a:spLocks noGrp="1"/>
+          </p:cNvSpPr>
+          <p:nvPr>
+            <p:ph idx="1"/>
+          </p:nvPr>
+        </p:nvSpPr>
+        <p:spPr/>
+        <p:txBody>
+          <a:bodyPr/>
+          <a:lstStyle/>
+          <a:p>
+            <a:r>
+              <a:rPr lang="en-US" dirty="0">
+                <a:latin typeface="Times New Roman" panose="02020603050405020304" pitchFamily="18" charset="0"/>
+                <a:cs typeface="Times New Roman" panose="02020603050405020304" pitchFamily="18" charset="0"/>
+              </a:rPr>
+              <a:t>String is a sequence of characters  stored in a 	contiguous block of memory and terminated by a </a:t>
+            </a:r>
+            <a:r>
+              <a:rPr lang="en-US" dirty="0">
+                <a:solidFill>
+                  <a:schemeClr val="tx2">
+                    <a:lumMod val="50000"/>
+                    <a:lumOff val="50000"/>
+                  </a:schemeClr>
+                </a:solidFill>
+                <a:latin typeface="Times New Roman" panose="02020603050405020304" pitchFamily="18" charset="0"/>
+                <a:cs typeface="Times New Roman" panose="02020603050405020304" pitchFamily="18" charset="0"/>
+              </a:rPr>
+              <a:t>null character(‘\0’).</a:t>
+            </a:r>
+          </a:p>
+          <a:p>
+            <a:r>
+              <a:rPr lang="en-US" dirty="0">
+                <a:latin typeface="Times New Roman" panose="02020603050405020304" pitchFamily="18" charset="0"/>
+                <a:cs typeface="Times New Roman" panose="02020603050405020304" pitchFamily="18" charset="0"/>
+              </a:rPr>
+              <a:t>This null terminator is crucial as it signals the end of the string, allowing functions to know where the string ends.</a:t>
+            </a:r>
+          </a:p>
+          <a:p>
+            <a:r>
+              <a:rPr lang="en-IN" dirty="0">
+                <a:latin typeface="Times New Roman" panose="02020603050405020304" pitchFamily="18" charset="0"/>
+                <a:cs typeface="Times New Roman" panose="02020603050405020304" pitchFamily="18" charset="0"/>
+              </a:rPr>
+              <a:t>char </a:t>
+            </a:r>
+            <a:r>
+              <a:rPr lang="en-IN" dirty="0" err="1">
+                <a:latin typeface="Times New Roman" panose="02020603050405020304" pitchFamily="18" charset="0"/>
+                <a:cs typeface="Times New Roman" panose="02020603050405020304" pitchFamily="18" charset="0"/>
+              </a:rPr>
+              <a:t>str_array</a:t>
+            </a:r>
+            <a:r>
+              <a:rPr lang="en-IN" dirty="0">
+                <a:latin typeface="Times New Roman" panose="02020603050405020304" pitchFamily="18" charset="0"/>
+                <a:cs typeface="Times New Roman" panose="02020603050405020304" pitchFamily="18" charset="0"/>
+              </a:rPr>
+              <a:t>[] = "Hello";</a:t>
+            </a:r>
+          </a:p>
+        </p:txBody>
+      </p:sp>
+    </p:spTree>
+    <p:extLst>
+      <p:ext uri="{BB962C8B-B14F-4D97-AF65-F5344CB8AC3E}">
+        <p14:creationId xmlns:p14="http://schemas.microsoft.com/office/powerpoint/2010/main" val="2128554438"/>
+      </p:ext>
+    </p:extLst>
+  </p:cSld>
+  <p:clrMapOvr>
+    <a:masterClrMapping/>
+  </p:clrMapOvr>
+</p:sld>
+</file>
+
+<file path=ppt/slides/slide22.xml><?xml version="1.0" encoding="utf-8"?>
+<p:sld xmlns:a="http://schemas.openxmlformats.org/drawingml/2006/main" xmlns:r="http://schemas.openxmlformats.org/officeDocument/2006/relationships" xmlns:p="http://schemas.openxmlformats.org/presentationml/2006/main">
+  <p:cSld>
+    <p:spTree>
+      <p:nvGrpSpPr>
+        <p:cNvPr id="1" name=""/>
+        <p:cNvGrpSpPr/>
+        <p:nvPr/>
+      </p:nvGrpSpPr>
+      <p:grpSpPr>
+        <a:xfrm>
+          <a:off x="0" y="0"/>
+          <a:ext cx="0" cy="0"/>
+          <a:chOff x="0" y="0"/>
+          <a:chExt cx="0" cy="0"/>
+        </a:xfrm>
+      </p:grpSpPr>
+      <p:sp>
+        <p:nvSpPr>
+          <p:cNvPr id="2" name="Title 1">
+            <a:extLst>
+              <a:ext uri="{FF2B5EF4-FFF2-40B4-BE49-F238E27FC236}">
+                <a16:creationId xmlns:a16="http://schemas.microsoft.com/office/drawing/2014/main" id="{889E51C0-F319-DDDD-5558-6231B7401330}"/>
+              </a:ext>
+            </a:extLst>
+          </p:cNvPr>
+          <p:cNvSpPr>
+            <a:spLocks noGrp="1"/>
+          </p:cNvSpPr>
+          <p:nvPr>
+            <p:ph type="title"/>
+          </p:nvPr>
+        </p:nvSpPr>
+        <p:spPr/>
+        <p:txBody>
+          <a:bodyPr/>
+          <a:lstStyle/>
+          <a:p>
+            <a:pPr algn="ctr"/>
+            <a:r>
+              <a:rPr lang="en-US" b="1" dirty="0">
+                <a:latin typeface="Times New Roman" panose="02020603050405020304" pitchFamily="18" charset="0"/>
+                <a:cs typeface="Times New Roman" panose="02020603050405020304" pitchFamily="18" charset="0"/>
+              </a:rPr>
+              <a:t>String Operations</a:t>
+            </a:r>
+            <a:r>
+              <a:rPr lang="en-US" dirty="0"/>
+              <a:t>	</a:t>
+            </a:r>
+            <a:endParaRPr lang="en-IN" dirty="0"/>
+          </a:p>
+        </p:txBody>
+      </p:sp>
+      <p:sp>
+        <p:nvSpPr>
+          <p:cNvPr id="3" name="Content Placeholder 2">
+            <a:extLst>
+              <a:ext uri="{FF2B5EF4-FFF2-40B4-BE49-F238E27FC236}">
+                <a16:creationId xmlns:a16="http://schemas.microsoft.com/office/drawing/2014/main" id="{572B3CCE-3B40-B17A-EEAF-9824FB6FC29F}"/>
+              </a:ext>
+            </a:extLst>
+          </p:cNvPr>
+          <p:cNvSpPr>
+            <a:spLocks noGrp="1"/>
+          </p:cNvSpPr>
+          <p:nvPr>
+            <p:ph idx="1"/>
+          </p:nvPr>
+        </p:nvSpPr>
+        <p:spPr/>
+        <p:txBody>
+          <a:bodyPr>
+            <a:normAutofit lnSpcReduction="10000"/>
+          </a:bodyPr>
+          <a:lstStyle/>
+          <a:p>
+            <a:r>
+              <a:rPr lang="en-US" dirty="0"/>
+              <a:t>String manipulation in C is done using functions from the &lt;</a:t>
+            </a:r>
+            <a:r>
+              <a:rPr lang="en-US" dirty="0" err="1"/>
+              <a:t>string.h</a:t>
+            </a:r>
+            <a:r>
+              <a:rPr lang="en-US" dirty="0"/>
+              <a:t>&gt; header file.</a:t>
+            </a:r>
+          </a:p>
+          <a:p>
+            <a:r>
+              <a:rPr lang="en-IN" dirty="0">
+                <a:solidFill>
+                  <a:schemeClr val="tx2">
+                    <a:lumMod val="90000"/>
+                    <a:lumOff val="10000"/>
+                  </a:schemeClr>
+                </a:solidFill>
+              </a:rPr>
+              <a:t>Concatenation</a:t>
+            </a:r>
+          </a:p>
+          <a:p>
+            <a:pPr lvl="1"/>
+            <a:r>
+              <a:rPr lang="en-IN" dirty="0" err="1"/>
+              <a:t>strcat</a:t>
+            </a:r>
+            <a:r>
+              <a:rPr lang="en-IN" dirty="0"/>
+              <a:t>(str1, str2);</a:t>
+            </a:r>
+          </a:p>
+          <a:p>
+            <a:r>
+              <a:rPr lang="en-IN" dirty="0">
+                <a:solidFill>
+                  <a:schemeClr val="tx2">
+                    <a:lumMod val="90000"/>
+                    <a:lumOff val="10000"/>
+                  </a:schemeClr>
+                </a:solidFill>
+              </a:rPr>
+              <a:t>Copying</a:t>
+            </a:r>
+          </a:p>
+          <a:p>
+            <a:pPr lvl="1"/>
+            <a:r>
+              <a:rPr lang="en-IN" dirty="0" err="1"/>
+              <a:t>strcpy</a:t>
+            </a:r>
+            <a:r>
+              <a:rPr lang="en-IN" dirty="0"/>
+              <a:t>(destination, source);</a:t>
+            </a:r>
+            <a:endParaRPr lang="en-IN" dirty="0">
+              <a:solidFill>
+                <a:schemeClr val="tx2">
+                  <a:lumMod val="90000"/>
+                  <a:lumOff val="10000"/>
+                </a:schemeClr>
+              </a:solidFill>
+            </a:endParaRPr>
+          </a:p>
+          <a:p>
+            <a:r>
+              <a:rPr lang="en-IN" dirty="0">
+                <a:solidFill>
+                  <a:schemeClr val="tx2">
+                    <a:lumMod val="90000"/>
+                    <a:lumOff val="10000"/>
+                  </a:schemeClr>
+                </a:solidFill>
+              </a:rPr>
+              <a:t>Length Calculation</a:t>
+            </a:r>
+          </a:p>
+          <a:p>
+            <a:pPr lvl="1"/>
+            <a:r>
+              <a:rPr lang="en-IN" dirty="0"/>
+              <a:t>int length = </a:t>
+            </a:r>
+            <a:r>
+              <a:rPr lang="en-IN" dirty="0" err="1"/>
+              <a:t>strlen</a:t>
+            </a:r>
+            <a:r>
+              <a:rPr lang="en-IN" dirty="0"/>
+              <a:t>(str);</a:t>
+            </a:r>
+            <a:endParaRPr lang="en-IN" dirty="0">
+              <a:solidFill>
+                <a:schemeClr val="tx2">
+                  <a:lumMod val="90000"/>
+                  <a:lumOff val="10000"/>
+                </a:schemeClr>
+              </a:solidFill>
+            </a:endParaRPr>
+          </a:p>
+          <a:p>
+            <a:r>
+              <a:rPr lang="en-IN" dirty="0">
+                <a:solidFill>
+                  <a:schemeClr val="tx2">
+                    <a:lumMod val="90000"/>
+                    <a:lumOff val="10000"/>
+                  </a:schemeClr>
+                </a:solidFill>
+              </a:rPr>
+              <a:t>Comparison</a:t>
+            </a:r>
+          </a:p>
+          <a:p>
+            <a:pPr lvl="1"/>
+            <a:r>
+              <a:rPr lang="en-IN" dirty="0"/>
+              <a:t>int result1 = </a:t>
+            </a:r>
+            <a:r>
+              <a:rPr lang="en-IN" dirty="0" err="1"/>
+              <a:t>strcmp</a:t>
+            </a:r>
+            <a:r>
+              <a:rPr lang="en-IN" dirty="0"/>
+              <a:t>(str1, str2);</a:t>
+            </a:r>
+            <a:endParaRPr lang="en-IN" dirty="0">
+              <a:solidFill>
+                <a:schemeClr val="tx2">
+                  <a:lumMod val="90000"/>
+                  <a:lumOff val="10000"/>
+                </a:schemeClr>
+              </a:solidFill>
+            </a:endParaRPr>
+          </a:p>
+          <a:p>
+            <a:endParaRPr lang="en-IN" dirty="0"/>
+          </a:p>
+        </p:txBody>
+      </p:sp>
+      <p:sp>
+        <p:nvSpPr>
+          <p:cNvPr id="4" name="TextBox 3">
+            <a:extLst>
+              <a:ext uri="{FF2B5EF4-FFF2-40B4-BE49-F238E27FC236}">
+                <a16:creationId xmlns:a16="http://schemas.microsoft.com/office/drawing/2014/main" id="{CD393931-C7B1-2029-C5A1-9389EE6141A5}"/>
+              </a:ext>
+            </a:extLst>
+          </p:cNvPr>
+          <p:cNvSpPr txBox="1"/>
+          <p:nvPr/>
+        </p:nvSpPr>
+        <p:spPr>
+          <a:xfrm>
+            <a:off x="8917858" y="5034116"/>
+            <a:ext cx="1938929" cy="369332"/>
+          </a:xfrm>
+          <a:prstGeom prst="rect">
+            <a:avLst/>
+          </a:prstGeom>
+          <a:noFill/>
+        </p:spPr>
+        <p:txBody>
+          <a:bodyPr wrap="none" rtlCol="0">
+            <a:spAutoFit/>
+          </a:bodyPr>
+          <a:lstStyle/>
+          <a:p>
+            <a:r>
+              <a:rPr lang="en-US" dirty="0"/>
+              <a:t>Sample Programs</a:t>
+            </a:r>
+            <a:endParaRPr lang="en-IN" dirty="0"/>
+          </a:p>
+        </p:txBody>
+      </p:sp>
+    </p:spTree>
+    <p:extLst>
+      <p:ext uri="{BB962C8B-B14F-4D97-AF65-F5344CB8AC3E}">
+        <p14:creationId xmlns:p14="http://schemas.microsoft.com/office/powerpoint/2010/main" val="4091484088"/>
       </p:ext>
     </p:extLst>
   </p:cSld>

</xml_diff>

<commit_message>
added all the programs of pointers
</commit_message>
<xml_diff>
--- a/THEORY/MODULE_2/MODULE2.pptx
+++ b/THEORY/MODULE_2/MODULE2.pptx
@@ -20,13 +20,11 @@
     <p:sldId id="267" r:id="rId14"/>
     <p:sldId id="268" r:id="rId15"/>
     <p:sldId id="271" r:id="rId16"/>
-    <p:sldId id="272" r:id="rId17"/>
-    <p:sldId id="273" r:id="rId18"/>
-    <p:sldId id="274" r:id="rId19"/>
-    <p:sldId id="275" r:id="rId20"/>
-    <p:sldId id="276" r:id="rId21"/>
-    <p:sldId id="277" r:id="rId22"/>
-    <p:sldId id="278" r:id="rId23"/>
+    <p:sldId id="274" r:id="rId17"/>
+    <p:sldId id="275" r:id="rId18"/>
+    <p:sldId id="276" r:id="rId19"/>
+    <p:sldId id="277" r:id="rId20"/>
+    <p:sldId id="278" r:id="rId21"/>
   </p:sldIdLst>
   <p:sldSz cx="12192000" cy="6858000"/>
   <p:notesSz cx="6858000" cy="9144000"/>
@@ -133,31 +131,38 @@
 </p:presentation>
 </file>
 
-<file path=ppt/revisionInfo.xml><?xml version="1.0" encoding="utf-8"?>
-<p1510:revInfo xmlns:a="http://schemas.openxmlformats.org/drawingml/2006/main" xmlns:r="http://schemas.openxmlformats.org/officeDocument/2006/relationships" xmlns:p1510="http://schemas.microsoft.com/office/powerpoint/2015/10/main">
-  <p1510:revLst>
-    <p1510:client id="{26CE66B5-9B85-49BD-BEC5-B66D43C69D2B}" v="54" dt="2025-09-12T10:00:38.853"/>
-  </p1510:revLst>
-</p1510:revInfo>
-</file>
-
 <file path=ppt/changesInfos/changesInfo1.xml><?xml version="1.0" encoding="utf-8"?>
 <pc:chgInfo xmlns:a="http://schemas.openxmlformats.org/drawingml/2006/main" xmlns:r="http://schemas.openxmlformats.org/officeDocument/2006/relationships" xmlns:ac="http://schemas.microsoft.com/office/drawing/2013/main/command" xmlns:pc="http://schemas.microsoft.com/office/powerpoint/2013/main/command">
   <pc:docChgLst>
     <pc:chgData name="Anugraha Shaju" userId="71a259dc963d91c3" providerId="LiveId" clId="{760CD989-CD68-488E-9730-D08BF003E4FB}"/>
     <pc:docChg chg="undo custSel addSld delSld modSld sldOrd">
-      <pc:chgData name="Anugraha Shaju" userId="71a259dc963d91c3" providerId="LiveId" clId="{760CD989-CD68-488E-9730-D08BF003E4FB}" dt="2025-09-12T10:12:06.531" v="780" actId="207"/>
+      <pc:chgData name="Anugraha Shaju" userId="71a259dc963d91c3" providerId="LiveId" clId="{760CD989-CD68-488E-9730-D08BF003E4FB}" dt="2025-09-16T04:04:55.595" v="792" actId="20577"/>
       <pc:docMkLst>
         <pc:docMk/>
       </pc:docMkLst>
       <pc:sldChg chg="modSp mod">
-        <pc:chgData name="Anugraha Shaju" userId="71a259dc963d91c3" providerId="LiveId" clId="{760CD989-CD68-488E-9730-D08BF003E4FB}" dt="2025-09-10T16:12:27.079" v="0" actId="2711"/>
+        <pc:chgData name="Anugraha Shaju" userId="71a259dc963d91c3" providerId="LiveId" clId="{760CD989-CD68-488E-9730-D08BF003E4FB}" dt="2025-09-16T03:30:16.041" v="781" actId="20577"/>
+        <pc:sldMkLst>
+          <pc:docMk/>
+          <pc:sldMk cId="455446505" sldId="260"/>
+        </pc:sldMkLst>
+        <pc:spChg chg="mod">
+          <ac:chgData name="Anugraha Shaju" userId="71a259dc963d91c3" providerId="LiveId" clId="{760CD989-CD68-488E-9730-D08BF003E4FB}" dt="2025-09-16T03:30:16.041" v="781" actId="20577"/>
+          <ac:spMkLst>
+            <pc:docMk/>
+            <pc:sldMk cId="455446505" sldId="260"/>
+            <ac:spMk id="3" creationId="{A2CD890B-0AC6-D36D-C009-4B3ED5FC895C}"/>
+          </ac:spMkLst>
+        </pc:spChg>
+      </pc:sldChg>
+      <pc:sldChg chg="modSp mod">
+        <pc:chgData name="Anugraha Shaju" userId="71a259dc963d91c3" providerId="LiveId" clId="{760CD989-CD68-488E-9730-D08BF003E4FB}" dt="2025-09-16T03:31:20.746" v="786" actId="20577"/>
         <pc:sldMkLst>
           <pc:docMk/>
           <pc:sldMk cId="3075238489" sldId="263"/>
         </pc:sldMkLst>
         <pc:spChg chg="mod">
-          <ac:chgData name="Anugraha Shaju" userId="71a259dc963d91c3" providerId="LiveId" clId="{760CD989-CD68-488E-9730-D08BF003E4FB}" dt="2025-09-10T16:12:27.079" v="0" actId="2711"/>
+          <ac:chgData name="Anugraha Shaju" userId="71a259dc963d91c3" providerId="LiveId" clId="{760CD989-CD68-488E-9730-D08BF003E4FB}" dt="2025-09-16T03:31:20.746" v="786" actId="20577"/>
           <ac:spMkLst>
             <pc:docMk/>
             <pc:sldMk cId="3075238489" sldId="263"/>
@@ -250,13 +255,13 @@
         </pc:spChg>
       </pc:sldChg>
       <pc:sldChg chg="modSp add mod">
-        <pc:chgData name="Anugraha Shaju" userId="71a259dc963d91c3" providerId="LiveId" clId="{760CD989-CD68-488E-9730-D08BF003E4FB}" dt="2025-09-10T16:29:13.533" v="133" actId="123"/>
+        <pc:chgData name="Anugraha Shaju" userId="71a259dc963d91c3" providerId="LiveId" clId="{760CD989-CD68-488E-9730-D08BF003E4FB}" dt="2025-09-16T04:04:55.595" v="792" actId="20577"/>
         <pc:sldMkLst>
           <pc:docMk/>
           <pc:sldMk cId="3129155865" sldId="268"/>
         </pc:sldMkLst>
         <pc:spChg chg="mod">
-          <ac:chgData name="Anugraha Shaju" userId="71a259dc963d91c3" providerId="LiveId" clId="{760CD989-CD68-488E-9730-D08BF003E4FB}" dt="2025-09-10T16:29:13.533" v="133" actId="123"/>
+          <ac:chgData name="Anugraha Shaju" userId="71a259dc963d91c3" providerId="LiveId" clId="{760CD989-CD68-488E-9730-D08BF003E4FB}" dt="2025-09-16T04:04:55.595" v="792" actId="20577"/>
           <ac:spMkLst>
             <pc:docMk/>
             <pc:sldMk cId="3129155865" sldId="268"/>
@@ -325,43 +330,19 @@
           </ac:spMkLst>
         </pc:spChg>
       </pc:sldChg>
-      <pc:sldChg chg="modSp add mod">
-        <pc:chgData name="Anugraha Shaju" userId="71a259dc963d91c3" providerId="LiveId" clId="{760CD989-CD68-488E-9730-D08BF003E4FB}" dt="2025-09-10T16:52:08.476" v="360" actId="113"/>
+      <pc:sldChg chg="modSp add del mod">
+        <pc:chgData name="Anugraha Shaju" userId="71a259dc963d91c3" providerId="LiveId" clId="{760CD989-CD68-488E-9730-D08BF003E4FB}" dt="2025-09-16T03:34:55.574" v="787" actId="2696"/>
         <pc:sldMkLst>
           <pc:docMk/>
           <pc:sldMk cId="2112089772" sldId="272"/>
         </pc:sldMkLst>
-        <pc:spChg chg="mod">
-          <ac:chgData name="Anugraha Shaju" userId="71a259dc963d91c3" providerId="LiveId" clId="{760CD989-CD68-488E-9730-D08BF003E4FB}" dt="2025-09-10T16:51:52.701" v="357" actId="1076"/>
-          <ac:spMkLst>
-            <pc:docMk/>
-            <pc:sldMk cId="2112089772" sldId="272"/>
-            <ac:spMk id="2" creationId="{59A0782D-2382-9675-C518-24E2318F347F}"/>
-          </ac:spMkLst>
-        </pc:spChg>
-        <pc:spChg chg="mod">
-          <ac:chgData name="Anugraha Shaju" userId="71a259dc963d91c3" providerId="LiveId" clId="{760CD989-CD68-488E-9730-D08BF003E4FB}" dt="2025-09-10T16:52:08.476" v="360" actId="113"/>
-          <ac:spMkLst>
-            <pc:docMk/>
-            <pc:sldMk cId="2112089772" sldId="272"/>
-            <ac:spMk id="3" creationId="{3688865B-5714-42E4-E7FC-9D0199A442F8}"/>
-          </ac:spMkLst>
-        </pc:spChg>
       </pc:sldChg>
       <pc:sldChg chg="modSp add del mod">
-        <pc:chgData name="Anugraha Shaju" userId="71a259dc963d91c3" providerId="LiveId" clId="{760CD989-CD68-488E-9730-D08BF003E4FB}" dt="2025-09-11T09:14:56.767" v="394" actId="2696"/>
+        <pc:chgData name="Anugraha Shaju" userId="71a259dc963d91c3" providerId="LiveId" clId="{760CD989-CD68-488E-9730-D08BF003E4FB}" dt="2025-09-16T03:35:04.328" v="788" actId="2696"/>
         <pc:sldMkLst>
           <pc:docMk/>
           <pc:sldMk cId="4176970" sldId="273"/>
         </pc:sldMkLst>
-        <pc:spChg chg="mod">
-          <ac:chgData name="Anugraha Shaju" userId="71a259dc963d91c3" providerId="LiveId" clId="{760CD989-CD68-488E-9730-D08BF003E4FB}" dt="2025-09-10T16:53:24.156" v="386" actId="20577"/>
-          <ac:spMkLst>
-            <pc:docMk/>
-            <pc:sldMk cId="4176970" sldId="273"/>
-            <ac:spMk id="3" creationId="{C4728B69-1220-F2CE-13BD-8598162A9DD4}"/>
-          </ac:spMkLst>
-        </pc:spChg>
       </pc:sldChg>
       <pc:sldChg chg="modSp add mod ord">
         <pc:chgData name="Anugraha Shaju" userId="71a259dc963d91c3" providerId="LiveId" clId="{760CD989-CD68-488E-9730-D08BF003E4FB}" dt="2025-09-10T17:29:49.546" v="392" actId="207"/>
@@ -624,7 +605,7 @@
           <a:p>
             <a:fld id="{6684D319-E430-4CC1-BA6E-D22CC260F6C5}" type="datetimeFigureOut">
               <a:rPr lang="en-IN" smtClean="0"/>
-              <a:t>12-09-2025</a:t>
+              <a:t>16-09-2025</a:t>
             </a:fld>
             <a:endParaRPr lang="en-IN"/>
           </a:p>
@@ -824,7 +805,7 @@
           <a:p>
             <a:fld id="{6684D319-E430-4CC1-BA6E-D22CC260F6C5}" type="datetimeFigureOut">
               <a:rPr lang="en-IN" smtClean="0"/>
-              <a:t>12-09-2025</a:t>
+              <a:t>16-09-2025</a:t>
             </a:fld>
             <a:endParaRPr lang="en-IN"/>
           </a:p>
@@ -1034,7 +1015,7 @@
           <a:p>
             <a:fld id="{6684D319-E430-4CC1-BA6E-D22CC260F6C5}" type="datetimeFigureOut">
               <a:rPr lang="en-IN" smtClean="0"/>
-              <a:t>12-09-2025</a:t>
+              <a:t>16-09-2025</a:t>
             </a:fld>
             <a:endParaRPr lang="en-IN"/>
           </a:p>
@@ -1234,7 +1215,7 @@
           <a:p>
             <a:fld id="{6684D319-E430-4CC1-BA6E-D22CC260F6C5}" type="datetimeFigureOut">
               <a:rPr lang="en-IN" smtClean="0"/>
-              <a:t>12-09-2025</a:t>
+              <a:t>16-09-2025</a:t>
             </a:fld>
             <a:endParaRPr lang="en-IN"/>
           </a:p>
@@ -1510,7 +1491,7 @@
           <a:p>
             <a:fld id="{6684D319-E430-4CC1-BA6E-D22CC260F6C5}" type="datetimeFigureOut">
               <a:rPr lang="en-IN" smtClean="0"/>
-              <a:t>12-09-2025</a:t>
+              <a:t>16-09-2025</a:t>
             </a:fld>
             <a:endParaRPr lang="en-IN"/>
           </a:p>
@@ -1778,7 +1759,7 @@
           <a:p>
             <a:fld id="{6684D319-E430-4CC1-BA6E-D22CC260F6C5}" type="datetimeFigureOut">
               <a:rPr lang="en-IN" smtClean="0"/>
-              <a:t>12-09-2025</a:t>
+              <a:t>16-09-2025</a:t>
             </a:fld>
             <a:endParaRPr lang="en-IN"/>
           </a:p>
@@ -2193,7 +2174,7 @@
           <a:p>
             <a:fld id="{6684D319-E430-4CC1-BA6E-D22CC260F6C5}" type="datetimeFigureOut">
               <a:rPr lang="en-IN" smtClean="0"/>
-              <a:t>12-09-2025</a:t>
+              <a:t>16-09-2025</a:t>
             </a:fld>
             <a:endParaRPr lang="en-IN"/>
           </a:p>
@@ -2335,7 +2316,7 @@
           <a:p>
             <a:fld id="{6684D319-E430-4CC1-BA6E-D22CC260F6C5}" type="datetimeFigureOut">
               <a:rPr lang="en-IN" smtClean="0"/>
-              <a:t>12-09-2025</a:t>
+              <a:t>16-09-2025</a:t>
             </a:fld>
             <a:endParaRPr lang="en-IN"/>
           </a:p>
@@ -2448,7 +2429,7 @@
           <a:p>
             <a:fld id="{6684D319-E430-4CC1-BA6E-D22CC260F6C5}" type="datetimeFigureOut">
               <a:rPr lang="en-IN" smtClean="0"/>
-              <a:t>12-09-2025</a:t>
+              <a:t>16-09-2025</a:t>
             </a:fld>
             <a:endParaRPr lang="en-IN"/>
           </a:p>
@@ -2761,7 +2742,7 @@
           <a:p>
             <a:fld id="{6684D319-E430-4CC1-BA6E-D22CC260F6C5}" type="datetimeFigureOut">
               <a:rPr lang="en-IN" smtClean="0"/>
-              <a:t>12-09-2025</a:t>
+              <a:t>16-09-2025</a:t>
             </a:fld>
             <a:endParaRPr lang="en-IN"/>
           </a:p>
@@ -3050,7 +3031,7 @@
           <a:p>
             <a:fld id="{6684D319-E430-4CC1-BA6E-D22CC260F6C5}" type="datetimeFigureOut">
               <a:rPr lang="en-IN" smtClean="0"/>
-              <a:t>12-09-2025</a:t>
+              <a:t>16-09-2025</a:t>
             </a:fld>
             <a:endParaRPr lang="en-IN"/>
           </a:p>
@@ -3293,7 +3274,7 @@
           <a:p>
             <a:fld id="{6684D319-E430-4CC1-BA6E-D22CC260F6C5}" type="datetimeFigureOut">
               <a:rPr lang="en-IN" smtClean="0"/>
-              <a:t>12-09-2025</a:t>
+              <a:t>16-09-2025</a:t>
             </a:fld>
             <a:endParaRPr lang="en-IN"/>
           </a:p>
@@ -4658,7 +4639,7 @@
                 <a:latin typeface="Times New Roman" panose="02020603050405020304" pitchFamily="18" charset="0"/>
                 <a:cs typeface="Times New Roman" panose="02020603050405020304" pitchFamily="18" charset="0"/>
               </a:rPr>
-              <a:t>[1][2] = { {10, 20, 30}, {40, 50, 60} };</a:t>
+              <a:t>[2][3] = { {10, 20, 30}, {40, 50, 60} };</a:t>
             </a:r>
           </a:p>
           <a:p>
@@ -4896,7 +4877,7 @@
         <p:cNvPr id="1" name="">
           <a:extLst>
             <a:ext uri="{FF2B5EF4-FFF2-40B4-BE49-F238E27FC236}">
-              <a16:creationId xmlns:a16="http://schemas.microsoft.com/office/drawing/2014/main" id="{D3ACD90D-B770-2369-9B62-9306394B061D}"/>
+              <a16:creationId xmlns:a16="http://schemas.microsoft.com/office/drawing/2014/main" id="{EA696884-77CC-75AA-4BB8-50CBCBE00251}"/>
             </a:ext>
           </a:extLst>
         </p:cNvPr>
@@ -4916,227 +4897,106 @@
           <p:cNvPr id="2" name="Title 1">
             <a:extLst>
               <a:ext uri="{FF2B5EF4-FFF2-40B4-BE49-F238E27FC236}">
-                <a16:creationId xmlns:a16="http://schemas.microsoft.com/office/drawing/2014/main" id="{59A0782D-2382-9675-C518-24E2318F347F}"/>
-              </a:ext>
-            </a:extLst>
-          </p:cNvPr>
-          <p:cNvSpPr>
-            <a:spLocks noGrp="1"/>
-          </p:cNvSpPr>
-          <p:nvPr>
-            <p:ph type="title"/>
+                <a16:creationId xmlns:a16="http://schemas.microsoft.com/office/drawing/2014/main" id="{E2472C54-B1BE-59C4-B9A1-3CED065A409B}"/>
+              </a:ext>
+            </a:extLst>
+          </p:cNvPr>
+          <p:cNvSpPr>
+            <a:spLocks noGrp="1"/>
+          </p:cNvSpPr>
+          <p:nvPr>
+            <p:ph type="ctrTitle"/>
           </p:nvPr>
         </p:nvSpPr>
         <p:spPr>
           <a:xfrm>
-            <a:off x="916858" y="-158699"/>
-            <a:ext cx="10515600" cy="1325563"/>
+            <a:off x="1809135" y="1041400"/>
+            <a:ext cx="9144000" cy="2387600"/>
           </a:xfrm>
         </p:spPr>
         <p:txBody>
           <a:bodyPr/>
           <a:lstStyle/>
           <a:p>
-            <a:pPr algn="ctr"/>
-            <a:r>
-              <a:rPr lang="en-IN" b="1" dirty="0">
-                <a:latin typeface="Times New Roman" panose="02020603050405020304" pitchFamily="18" charset="0"/>
-                <a:cs typeface="Times New Roman" panose="02020603050405020304" pitchFamily="18" charset="0"/>
-              </a:rPr>
-              <a:t>Multi-Dimensional Arrays</a:t>
-            </a:r>
-            <a:br>
-              <a:rPr lang="en-IN" b="1" dirty="0">
-                <a:latin typeface="Times New Roman" panose="02020603050405020304" pitchFamily="18" charset="0"/>
-                <a:cs typeface="Times New Roman" panose="02020603050405020304" pitchFamily="18" charset="0"/>
-              </a:rPr>
-            </a:br>
-            <a:r>
-              <a:rPr lang="en-IN" sz="2400" dirty="0">
-                <a:latin typeface="Times New Roman" panose="02020603050405020304" pitchFamily="18" charset="0"/>
-                <a:cs typeface="Times New Roman" panose="02020603050405020304" pitchFamily="18" charset="0"/>
-              </a:rPr>
-              <a:t>Programs</a:t>
-            </a:r>
-          </a:p>
-        </p:txBody>
-      </p:sp>
-      <p:sp>
-        <p:nvSpPr>
-          <p:cNvPr id="3" name="Content Placeholder 2">
-            <a:extLst>
-              <a:ext uri="{FF2B5EF4-FFF2-40B4-BE49-F238E27FC236}">
-                <a16:creationId xmlns:a16="http://schemas.microsoft.com/office/drawing/2014/main" id="{3688865B-5714-42E4-E7FC-9D0199A442F8}"/>
-              </a:ext>
-            </a:extLst>
-          </p:cNvPr>
-          <p:cNvSpPr>
-            <a:spLocks noGrp="1"/>
-          </p:cNvSpPr>
-          <p:nvPr>
-            <p:ph idx="1"/>
+            <a:r>
+              <a:rPr lang="en-US" dirty="0">
+                <a:solidFill>
+                  <a:srgbClr val="FF0000"/>
+                </a:solidFill>
+                <a:latin typeface="Times New Roman" panose="02020603050405020304" pitchFamily="18" charset="0"/>
+                <a:cs typeface="Times New Roman" panose="02020603050405020304" pitchFamily="18" charset="0"/>
+              </a:rPr>
+              <a:t>PROGRAMMING IN C	</a:t>
+            </a:r>
+            <a:endParaRPr lang="en-IN" dirty="0">
+              <a:solidFill>
+                <a:srgbClr val="FF0000"/>
+              </a:solidFill>
+              <a:latin typeface="Times New Roman" panose="02020603050405020304" pitchFamily="18" charset="0"/>
+              <a:cs typeface="Times New Roman" panose="02020603050405020304" pitchFamily="18" charset="0"/>
+            </a:endParaRPr>
+          </a:p>
+        </p:txBody>
+      </p:sp>
+      <p:sp>
+        <p:nvSpPr>
+          <p:cNvPr id="3" name="Subtitle 2">
+            <a:extLst>
+              <a:ext uri="{FF2B5EF4-FFF2-40B4-BE49-F238E27FC236}">
+                <a16:creationId xmlns:a16="http://schemas.microsoft.com/office/drawing/2014/main" id="{80366348-C365-ACDC-1B02-3C3D69083518}"/>
+              </a:ext>
+            </a:extLst>
+          </p:cNvPr>
+          <p:cNvSpPr>
+            <a:spLocks noGrp="1"/>
+          </p:cNvSpPr>
+          <p:nvPr>
+            <p:ph type="subTitle" idx="1"/>
           </p:nvPr>
         </p:nvSpPr>
         <p:spPr>
           <a:xfrm>
-            <a:off x="916858" y="940722"/>
-            <a:ext cx="10515600" cy="4351338"/>
+            <a:off x="614516" y="3429000"/>
+            <a:ext cx="10962967" cy="1854865"/>
           </a:xfrm>
         </p:spPr>
         <p:txBody>
           <a:bodyPr>
-            <a:noAutofit/>
+            <a:normAutofit fontScale="85000" lnSpcReduction="20000"/>
           </a:bodyPr>
           <a:lstStyle/>
           <a:p>
+            <a:r>
+              <a:rPr lang="en-US" dirty="0"/>
+              <a:t>MODULE 2</a:t>
+            </a:r>
+          </a:p>
+          <a:p>
             <a:pPr algn="just"/>
             <a:r>
-              <a:rPr lang="en-IN" sz="1800" b="1" dirty="0"/>
-              <a:t>Matrix Addition</a:t>
-            </a:r>
-          </a:p>
-          <a:p>
-            <a:pPr marL="0" indent="0" algn="just">
-              <a:buNone/>
-            </a:pPr>
-            <a:r>
-              <a:rPr lang="en-IN" sz="1800" dirty="0"/>
-              <a:t>Enter elements for the first matrix (2 x 3): </a:t>
-            </a:r>
-          </a:p>
-          <a:p>
-            <a:pPr marL="0" indent="0" algn="just">
-              <a:buNone/>
-            </a:pPr>
-            <a:r>
-              <a:rPr lang="en-IN" sz="1800" dirty="0"/>
-              <a:t>Enter element : 2 </a:t>
-            </a:r>
-          </a:p>
-          <a:p>
-            <a:pPr marL="0" indent="0" algn="just">
-              <a:buNone/>
-            </a:pPr>
-            <a:r>
-              <a:rPr lang="en-IN" sz="1800" dirty="0"/>
-              <a:t>Enter element : 3 </a:t>
-            </a:r>
-          </a:p>
-          <a:p>
-            <a:pPr marL="0" indent="0" algn="just">
-              <a:buNone/>
-            </a:pPr>
-            <a:r>
-              <a:rPr lang="en-IN" sz="1800" dirty="0"/>
-              <a:t>Enter element : 4 </a:t>
-            </a:r>
-          </a:p>
-          <a:p>
-            <a:pPr marL="0" indent="0" algn="just">
-              <a:buNone/>
-            </a:pPr>
-            <a:r>
-              <a:rPr lang="en-IN" sz="1800" dirty="0"/>
-              <a:t>Enter element : 5 </a:t>
-            </a:r>
-          </a:p>
-          <a:p>
-            <a:pPr marL="0" indent="0" algn="just">
-              <a:buNone/>
-            </a:pPr>
-            <a:r>
-              <a:rPr lang="en-IN" sz="1800" dirty="0"/>
-              <a:t>Enter element : 2 </a:t>
-            </a:r>
-          </a:p>
-          <a:p>
-            <a:pPr marL="0" indent="0" algn="just">
-              <a:buNone/>
-            </a:pPr>
-            <a:r>
-              <a:rPr lang="en-IN" sz="1800" dirty="0"/>
-              <a:t>Enter element : 3 </a:t>
-            </a:r>
-          </a:p>
-          <a:p>
-            <a:pPr marL="0" indent="0" algn="just">
-              <a:buNone/>
-            </a:pPr>
-            <a:r>
-              <a:rPr lang="en-IN" sz="1800" dirty="0"/>
-              <a:t>Enter elements for the second matrix (2 x 3): </a:t>
-            </a:r>
-          </a:p>
-          <a:p>
-            <a:pPr marL="0" indent="0" algn="just">
-              <a:buNone/>
-            </a:pPr>
-            <a:r>
-              <a:rPr lang="en-IN" sz="1800" dirty="0"/>
-              <a:t>Enter element : -4 </a:t>
-            </a:r>
-          </a:p>
-          <a:p>
-            <a:pPr marL="0" indent="0" algn="just">
-              <a:buNone/>
-            </a:pPr>
-            <a:r>
-              <a:rPr lang="en-IN" sz="1800" dirty="0"/>
-              <a:t>Enter element : 5 </a:t>
-            </a:r>
-          </a:p>
-          <a:p>
-            <a:pPr marL="0" indent="0" algn="just">
-              <a:buNone/>
-            </a:pPr>
-            <a:r>
-              <a:rPr lang="en-IN" sz="1800" dirty="0"/>
-              <a:t>Enter element : 3 </a:t>
-            </a:r>
-          </a:p>
-          <a:p>
-            <a:pPr marL="0" indent="0" algn="just">
-              <a:buNone/>
-            </a:pPr>
-            <a:r>
-              <a:rPr lang="en-IN" sz="1800" dirty="0"/>
-              <a:t>Enter element : 5 </a:t>
-            </a:r>
-          </a:p>
-          <a:p>
-            <a:pPr marL="0" indent="0" algn="just">
-              <a:buNone/>
-            </a:pPr>
-            <a:r>
-              <a:rPr lang="en-IN" sz="1800" dirty="0"/>
-              <a:t>Enter element : 6 </a:t>
-            </a:r>
-          </a:p>
-          <a:p>
-            <a:pPr marL="0" indent="0" algn="just">
-              <a:buNone/>
-            </a:pPr>
-            <a:r>
-              <a:rPr lang="en-IN" sz="1800" dirty="0"/>
-              <a:t>Enter element : 3 </a:t>
-            </a:r>
-          </a:p>
-          <a:p>
-            <a:pPr marL="0" indent="0" algn="just">
-              <a:buNone/>
-            </a:pPr>
-            <a:r>
-              <a:rPr lang="en-IN" sz="1800" dirty="0"/>
-              <a:t>Sum of the two matrices: -2 8 7 10 8 6</a:t>
-            </a:r>
-            <a:endParaRPr lang="en-US" sz="1800" dirty="0"/>
+              <a:rPr lang="en-US" dirty="0"/>
+              <a:t>Summarize the definition, initialization and accessing of single and multi dimensional arrays, Develop programs using single and multidimensional arrays, Illustrate the concept of divide and conquer method in solving problems, Develop C programs to implement searching (linear search and binary search) and sorting (selection sort and quicksort) algorithms. Explain the representation of strings in C, Develop C programs to perform different operations on strings</a:t>
+            </a:r>
+            <a:r>
+              <a:rPr lang="en-US" dirty="0">
+                <a:solidFill>
+                  <a:schemeClr val="accent6"/>
+                </a:solidFill>
+              </a:rPr>
+              <a:t>, Illustrate passing arrays as parameters to a function.</a:t>
+            </a:r>
+            <a:endParaRPr lang="en-IN" dirty="0">
+              <a:solidFill>
+                <a:schemeClr val="accent6"/>
+              </a:solidFill>
+            </a:endParaRPr>
           </a:p>
         </p:txBody>
       </p:sp>
     </p:spTree>
     <p:extLst>
       <p:ext uri="{BB962C8B-B14F-4D97-AF65-F5344CB8AC3E}">
-        <p14:creationId xmlns:p14="http://schemas.microsoft.com/office/powerpoint/2010/main" val="2112089772"/>
+        <p14:creationId xmlns:p14="http://schemas.microsoft.com/office/powerpoint/2010/main" val="781190804"/>
       </p:ext>
     </p:extLst>
   </p:cSld>
@@ -5151,13 +5011,7 @@
   <p:cSld>
     <p:spTree>
       <p:nvGrpSpPr>
-        <p:cNvPr id="1" name="">
-          <a:extLst>
-            <a:ext uri="{FF2B5EF4-FFF2-40B4-BE49-F238E27FC236}">
-              <a16:creationId xmlns:a16="http://schemas.microsoft.com/office/drawing/2014/main" id="{5613847C-3EAA-1D5F-3373-2F1738224FF9}"/>
-            </a:ext>
-          </a:extLst>
-        </p:cNvPr>
+        <p:cNvPr id="1" name=""/>
         <p:cNvGrpSpPr/>
         <p:nvPr/>
       </p:nvGrpSpPr>
@@ -5174,7 +5028,7 @@
           <p:cNvPr id="2" name="Title 1">
             <a:extLst>
               <a:ext uri="{FF2B5EF4-FFF2-40B4-BE49-F238E27FC236}">
-                <a16:creationId xmlns:a16="http://schemas.microsoft.com/office/drawing/2014/main" id="{14A1A6EA-2022-E2C1-8994-94ECCE567825}"/>
+                <a16:creationId xmlns:a16="http://schemas.microsoft.com/office/drawing/2014/main" id="{33B6E283-D7B3-13C1-B254-830BEEC872A6}"/>
               </a:ext>
             </a:extLst>
           </p:cNvPr>
@@ -5185,37 +5039,23 @@
             <p:ph type="title"/>
           </p:nvPr>
         </p:nvSpPr>
-        <p:spPr>
-          <a:xfrm>
-            <a:off x="916858" y="-158699"/>
-            <a:ext cx="10515600" cy="1325563"/>
-          </a:xfrm>
-        </p:spPr>
+        <p:spPr/>
         <p:txBody>
           <a:bodyPr/>
           <a:lstStyle/>
           <a:p>
             <a:pPr algn="ctr"/>
             <a:r>
-              <a:rPr lang="en-IN" b="1" dirty="0">
-                <a:latin typeface="Times New Roman" panose="02020603050405020304" pitchFamily="18" charset="0"/>
-                <a:cs typeface="Times New Roman" panose="02020603050405020304" pitchFamily="18" charset="0"/>
-              </a:rPr>
-              <a:t>Multi-Dimensional Arrays</a:t>
-            </a:r>
-            <a:br>
-              <a:rPr lang="en-IN" b="1" dirty="0">
-                <a:latin typeface="Times New Roman" panose="02020603050405020304" pitchFamily="18" charset="0"/>
-                <a:cs typeface="Times New Roman" panose="02020603050405020304" pitchFamily="18" charset="0"/>
-              </a:rPr>
-            </a:br>
-            <a:r>
-              <a:rPr lang="en-IN" sz="2400" dirty="0">
-                <a:latin typeface="Times New Roman" panose="02020603050405020304" pitchFamily="18" charset="0"/>
-                <a:cs typeface="Times New Roman" panose="02020603050405020304" pitchFamily="18" charset="0"/>
-              </a:rPr>
-              <a:t>Programs</a:t>
-            </a:r>
+              <a:rPr lang="en-US" dirty="0">
+                <a:latin typeface="Times New Roman" panose="02020603050405020304" pitchFamily="18" charset="0"/>
+                <a:cs typeface="Times New Roman" panose="02020603050405020304" pitchFamily="18" charset="0"/>
+              </a:rPr>
+              <a:t>Passing Arrays </a:t>
+            </a:r>
+            <a:endParaRPr lang="en-IN" dirty="0">
+              <a:latin typeface="Times New Roman" panose="02020603050405020304" pitchFamily="18" charset="0"/>
+              <a:cs typeface="Times New Roman" panose="02020603050405020304" pitchFamily="18" charset="0"/>
+            </a:endParaRPr>
           </a:p>
         </p:txBody>
       </p:sp>
@@ -5224,7 +5064,7 @@
           <p:cNvPr id="3" name="Content Placeholder 2">
             <a:extLst>
               <a:ext uri="{FF2B5EF4-FFF2-40B4-BE49-F238E27FC236}">
-                <a16:creationId xmlns:a16="http://schemas.microsoft.com/office/drawing/2014/main" id="{C4728B69-1220-F2CE-13BD-8598162A9DD4}"/>
+                <a16:creationId xmlns:a16="http://schemas.microsoft.com/office/drawing/2014/main" id="{56397864-150F-3411-3F9E-747806EF93FF}"/>
               </a:ext>
             </a:extLst>
           </p:cNvPr>
@@ -5235,109 +5075,61 @@
             <p:ph idx="1"/>
           </p:nvPr>
         </p:nvSpPr>
-        <p:spPr>
-          <a:xfrm>
-            <a:off x="916858" y="940722"/>
-            <a:ext cx="10515600" cy="4351338"/>
-          </a:xfrm>
-        </p:spPr>
-        <p:txBody>
-          <a:bodyPr>
-            <a:noAutofit/>
-          </a:bodyPr>
-          <a:lstStyle/>
-          <a:p>
-            <a:pPr algn="just"/>
-            <a:endParaRPr lang="en-IN" sz="1800" b="1" dirty="0"/>
-          </a:p>
-          <a:p>
-            <a:pPr algn="just"/>
-            <a:r>
-              <a:rPr lang="en-IN" sz="1800" b="1" dirty="0"/>
-              <a:t>Home work</a:t>
-            </a:r>
-          </a:p>
-          <a:p>
-            <a:pPr algn="just"/>
-            <a:r>
-              <a:rPr lang="en-IN" sz="1800" b="1" dirty="0"/>
-              <a:t>Matrix Transposition</a:t>
-            </a:r>
-          </a:p>
-          <a:p>
-            <a:pPr marL="0" indent="0" algn="just">
-              <a:buNone/>
-            </a:pPr>
-            <a:r>
-              <a:rPr lang="fr-FR" sz="1800" dirty="0"/>
-              <a:t>Original Matrix (2 x 3): </a:t>
-            </a:r>
-          </a:p>
-          <a:p>
-            <a:pPr marL="0" indent="0" algn="just">
-              <a:buNone/>
-            </a:pPr>
-            <a:r>
-              <a:rPr lang="fr-FR" sz="1800" dirty="0"/>
-              <a:t>1 2 3 </a:t>
-            </a:r>
-          </a:p>
-          <a:p>
-            <a:pPr marL="0" indent="0" algn="just">
-              <a:buNone/>
-            </a:pPr>
-            <a:r>
-              <a:rPr lang="fr-FR" sz="1800" dirty="0"/>
-              <a:t>4 5 6 </a:t>
-            </a:r>
-          </a:p>
-          <a:p>
-            <a:pPr marL="0" indent="0" algn="just">
-              <a:buNone/>
-            </a:pPr>
-            <a:r>
-              <a:rPr lang="fr-FR" sz="1800" dirty="0" err="1"/>
-              <a:t>Transposed</a:t>
-            </a:r>
-            <a:r>
-              <a:rPr lang="fr-FR" sz="1800" dirty="0"/>
-              <a:t> Matrix (3 x 2): </a:t>
-            </a:r>
-          </a:p>
-          <a:p>
-            <a:pPr marL="0" indent="0" algn="just">
-              <a:buNone/>
-            </a:pPr>
-            <a:r>
-              <a:rPr lang="fr-FR" sz="1800" dirty="0"/>
-              <a:t>1 4 </a:t>
-            </a:r>
-          </a:p>
-          <a:p>
-            <a:pPr marL="0" indent="0" algn="just">
-              <a:buNone/>
-            </a:pPr>
-            <a:r>
-              <a:rPr lang="fr-FR" sz="1800" dirty="0"/>
-              <a:t>2 5 </a:t>
-            </a:r>
-          </a:p>
-          <a:p>
-            <a:pPr marL="0" indent="0" algn="just">
-              <a:buNone/>
-            </a:pPr>
-            <a:r>
-              <a:rPr lang="fr-FR" sz="1800" dirty="0"/>
-              <a:t>3 6</a:t>
-            </a:r>
-            <a:endParaRPr lang="en-IN" sz="1800" b="1" dirty="0"/>
+        <p:spPr/>
+        <p:txBody>
+          <a:bodyPr/>
+          <a:lstStyle/>
+          <a:p>
+            <a:r>
+              <a:rPr lang="en-US" dirty="0">
+                <a:latin typeface="Times New Roman" panose="02020603050405020304" pitchFamily="18" charset="0"/>
+                <a:cs typeface="Times New Roman" panose="02020603050405020304" pitchFamily="18" charset="0"/>
+              </a:rPr>
+              <a:t>In C, you can </a:t>
+            </a:r>
+            <a:r>
+              <a:rPr lang="en-US" b="1" dirty="0">
+                <a:latin typeface="Times New Roman" panose="02020603050405020304" pitchFamily="18" charset="0"/>
+                <a:cs typeface="Times New Roman" panose="02020603050405020304" pitchFamily="18" charset="0"/>
+              </a:rPr>
+              <a:t>pass arrays as parameters to a function</a:t>
+            </a:r>
+            <a:r>
+              <a:rPr lang="en-US" dirty="0">
+                <a:latin typeface="Times New Roman" panose="02020603050405020304" pitchFamily="18" charset="0"/>
+                <a:cs typeface="Times New Roman" panose="02020603050405020304" pitchFamily="18" charset="0"/>
+              </a:rPr>
+              <a:t> in order to process them (like printing, summing, etc.).</a:t>
+            </a:r>
+          </a:p>
+          <a:p>
+            <a:r>
+              <a:rPr lang="en-US" dirty="0">
+                <a:latin typeface="Times New Roman" panose="02020603050405020304" pitchFamily="18" charset="0"/>
+                <a:cs typeface="Times New Roman" panose="02020603050405020304" pitchFamily="18" charset="0"/>
+              </a:rPr>
+              <a:t>Function to calculate sum of array elements –Single Dimensional</a:t>
+            </a:r>
+          </a:p>
+          <a:p>
+            <a:r>
+              <a:rPr lang="en-US" dirty="0">
+                <a:latin typeface="Times New Roman" panose="02020603050405020304" pitchFamily="18" charset="0"/>
+                <a:cs typeface="Times New Roman" panose="02020603050405020304" pitchFamily="18" charset="0"/>
+              </a:rPr>
+              <a:t>Print 2d Matrix Array – Multi- Dimensional</a:t>
+            </a:r>
+            <a:endParaRPr lang="en-IN" dirty="0">
+              <a:latin typeface="Times New Roman" panose="02020603050405020304" pitchFamily="18" charset="0"/>
+              <a:cs typeface="Times New Roman" panose="02020603050405020304" pitchFamily="18" charset="0"/>
+            </a:endParaRPr>
           </a:p>
         </p:txBody>
       </p:sp>
     </p:spTree>
     <p:extLst>
       <p:ext uri="{BB962C8B-B14F-4D97-AF65-F5344CB8AC3E}">
-        <p14:creationId xmlns:p14="http://schemas.microsoft.com/office/powerpoint/2010/main" val="4176970"/>
+        <p14:creationId xmlns:p14="http://schemas.microsoft.com/office/powerpoint/2010/main" val="439685860"/>
       </p:ext>
     </p:extLst>
   </p:cSld>
@@ -5355,7 +5147,7 @@
         <p:cNvPr id="1" name="">
           <a:extLst>
             <a:ext uri="{FF2B5EF4-FFF2-40B4-BE49-F238E27FC236}">
-              <a16:creationId xmlns:a16="http://schemas.microsoft.com/office/drawing/2014/main" id="{EA696884-77CC-75AA-4BB8-50CBCBE00251}"/>
+              <a16:creationId xmlns:a16="http://schemas.microsoft.com/office/drawing/2014/main" id="{4F781140-F5AE-0546-7E17-8640A4B22960}"/>
             </a:ext>
           </a:extLst>
         </p:cNvPr>
@@ -5375,7 +5167,7 @@
           <p:cNvPr id="2" name="Title 1">
             <a:extLst>
               <a:ext uri="{FF2B5EF4-FFF2-40B4-BE49-F238E27FC236}">
-                <a16:creationId xmlns:a16="http://schemas.microsoft.com/office/drawing/2014/main" id="{E2472C54-B1BE-59C4-B9A1-3CED065A409B}"/>
+                <a16:creationId xmlns:a16="http://schemas.microsoft.com/office/drawing/2014/main" id="{0308CA2A-8F7E-ABBF-B17A-2A102FEA21A6}"/>
               </a:ext>
             </a:extLst>
           </p:cNvPr>
@@ -5421,7 +5213,7 @@
           <p:cNvPr id="3" name="Subtitle 2">
             <a:extLst>
               <a:ext uri="{FF2B5EF4-FFF2-40B4-BE49-F238E27FC236}">
-                <a16:creationId xmlns:a16="http://schemas.microsoft.com/office/drawing/2014/main" id="{80366348-C365-ACDC-1B02-3C3D69083518}"/>
+                <a16:creationId xmlns:a16="http://schemas.microsoft.com/office/drawing/2014/main" id="{CFD2C0DF-F7BC-8729-2930-5C1165E77464}"/>
               </a:ext>
             </a:extLst>
           </p:cNvPr>
@@ -5453,19 +5245,49 @@
             <a:pPr algn="just"/>
             <a:r>
               <a:rPr lang="en-US" dirty="0"/>
-              <a:t>Summarize the definition, initialization and accessing of single and multi dimensional arrays, Develop programs using single and multidimensional arrays, Illustrate the concept of divide and conquer method in solving problems, Develop C programs to implement searching (linear search and binary search) and sorting (selection sort and quicksort) algorithms. Explain the representation of strings in C, Develop C programs to perform different operations on strings</a:t>
+              <a:t>Summarize the definition, initialization and accessing of single and multi dimensional arrays, Develop programs using single and multidimensional arrays, Illustrate the concept of divide and conquer method in solving problems, Develop C programs to implement searching (linear search and binary search) and sorting (selection sort and quicksort) algorithms. </a:t>
             </a:r>
             <a:r>
               <a:rPr lang="en-US" dirty="0">
                 <a:solidFill>
-                  <a:schemeClr val="accent6"/>
+                  <a:srgbClr val="00B050"/>
+                </a:solidFill>
+              </a:rPr>
+              <a:t>Explain the representation of strings in C</a:t>
+            </a:r>
+            <a:r>
+              <a:rPr lang="en-US" dirty="0">
+                <a:solidFill>
+                  <a:schemeClr val="bg2">
+                    <a:lumMod val="10000"/>
+                  </a:schemeClr>
+                </a:solidFill>
+              </a:rPr>
+              <a:t>, </a:t>
+            </a:r>
+            <a:r>
+              <a:rPr lang="en-US" dirty="0">
+                <a:solidFill>
+                  <a:srgbClr val="00B050"/>
+                </a:solidFill>
+              </a:rPr>
+              <a:t>Develop C programs to perform different operations on strings</a:t>
+            </a:r>
+            <a:r>
+              <a:rPr lang="en-US" dirty="0">
+                <a:solidFill>
+                  <a:schemeClr val="bg2">
+                    <a:lumMod val="10000"/>
+                  </a:schemeClr>
                 </a:solidFill>
               </a:rPr>
               <a:t>, Illustrate passing arrays as parameters to a function.</a:t>
             </a:r>
             <a:endParaRPr lang="en-IN" dirty="0">
               <a:solidFill>
-                <a:schemeClr val="accent6"/>
+                <a:schemeClr val="bg2">
+                  <a:lumMod val="10000"/>
+                </a:schemeClr>
               </a:solidFill>
             </a:endParaRPr>
           </a:p>
@@ -5474,7 +5296,7 @@
     </p:spTree>
     <p:extLst>
       <p:ext uri="{BB962C8B-B14F-4D97-AF65-F5344CB8AC3E}">
-        <p14:creationId xmlns:p14="http://schemas.microsoft.com/office/powerpoint/2010/main" val="781190804"/>
+        <p14:creationId xmlns:p14="http://schemas.microsoft.com/office/powerpoint/2010/main" val="1921615921"/>
       </p:ext>
     </p:extLst>
   </p:cSld>
@@ -5506,7 +5328,7 @@
           <p:cNvPr id="2" name="Title 1">
             <a:extLst>
               <a:ext uri="{FF2B5EF4-FFF2-40B4-BE49-F238E27FC236}">
-                <a16:creationId xmlns:a16="http://schemas.microsoft.com/office/drawing/2014/main" id="{33B6E283-D7B3-13C1-B254-830BEEC872A6}"/>
+                <a16:creationId xmlns:a16="http://schemas.microsoft.com/office/drawing/2014/main" id="{1EC6F273-FDA1-57CE-8DAB-4F45CEBF9322}"/>
               </a:ext>
             </a:extLst>
           </p:cNvPr>
@@ -5524,13 +5346,13 @@
           <a:p>
             <a:pPr algn="ctr"/>
             <a:r>
-              <a:rPr lang="en-US" dirty="0">
-                <a:latin typeface="Times New Roman" panose="02020603050405020304" pitchFamily="18" charset="0"/>
-                <a:cs typeface="Times New Roman" panose="02020603050405020304" pitchFamily="18" charset="0"/>
-              </a:rPr>
-              <a:t>Passing Arrays </a:t>
-            </a:r>
-            <a:endParaRPr lang="en-IN" dirty="0">
+              <a:rPr lang="en-US" b="1" dirty="0">
+                <a:latin typeface="Times New Roman" panose="02020603050405020304" pitchFamily="18" charset="0"/>
+                <a:cs typeface="Times New Roman" panose="02020603050405020304" pitchFamily="18" charset="0"/>
+              </a:rPr>
+              <a:t>String	</a:t>
+            </a:r>
+            <a:endParaRPr lang="en-IN" b="1" dirty="0">
               <a:latin typeface="Times New Roman" panose="02020603050405020304" pitchFamily="18" charset="0"/>
               <a:cs typeface="Times New Roman" panose="02020603050405020304" pitchFamily="18" charset="0"/>
             </a:endParaRPr>
@@ -5542,7 +5364,7 @@
           <p:cNvPr id="3" name="Content Placeholder 2">
             <a:extLst>
               <a:ext uri="{FF2B5EF4-FFF2-40B4-BE49-F238E27FC236}">
-                <a16:creationId xmlns:a16="http://schemas.microsoft.com/office/drawing/2014/main" id="{56397864-150F-3411-3F9E-747806EF93FF}"/>
+                <a16:creationId xmlns:a16="http://schemas.microsoft.com/office/drawing/2014/main" id="{6DB22EC7-714F-95A5-85AC-47F8D33F4077}"/>
               </a:ext>
             </a:extLst>
           </p:cNvPr>
@@ -5563,21 +5385,20 @@
                 <a:latin typeface="Times New Roman" panose="02020603050405020304" pitchFamily="18" charset="0"/>
                 <a:cs typeface="Times New Roman" panose="02020603050405020304" pitchFamily="18" charset="0"/>
               </a:rPr>
-              <a:t>In C, you can </a:t>
-            </a:r>
-            <a:r>
-              <a:rPr lang="en-US" b="1" dirty="0">
-                <a:latin typeface="Times New Roman" panose="02020603050405020304" pitchFamily="18" charset="0"/>
-                <a:cs typeface="Times New Roman" panose="02020603050405020304" pitchFamily="18" charset="0"/>
-              </a:rPr>
-              <a:t>pass arrays as parameters to a function</a:t>
+              <a:t>String is a sequence of characters  stored in a 	contiguous block of memory and terminated by a </a:t>
             </a:r>
             <a:r>
               <a:rPr lang="en-US" dirty="0">
-                <a:latin typeface="Times New Roman" panose="02020603050405020304" pitchFamily="18" charset="0"/>
-                <a:cs typeface="Times New Roman" panose="02020603050405020304" pitchFamily="18" charset="0"/>
-              </a:rPr>
-              <a:t> in order to process them (like printing, summing, etc.).</a:t>
+                <a:solidFill>
+                  <a:schemeClr val="tx2">
+                    <a:lumMod val="50000"/>
+                    <a:lumOff val="50000"/>
+                  </a:schemeClr>
+                </a:solidFill>
+                <a:latin typeface="Times New Roman" panose="02020603050405020304" pitchFamily="18" charset="0"/>
+                <a:cs typeface="Times New Roman" panose="02020603050405020304" pitchFamily="18" charset="0"/>
+              </a:rPr>
+              <a:t>null character(‘\0’).</a:t>
             </a:r>
           </a:p>
           <a:p>
@@ -5586,28 +5407,38 @@
                 <a:latin typeface="Times New Roman" panose="02020603050405020304" pitchFamily="18" charset="0"/>
                 <a:cs typeface="Times New Roman" panose="02020603050405020304" pitchFamily="18" charset="0"/>
               </a:rPr>
-              <a:t>Function to calculate sum of array elements –Single Dimensional</a:t>
-            </a:r>
-          </a:p>
-          <a:p>
-            <a:r>
-              <a:rPr lang="en-US" dirty="0">
-                <a:latin typeface="Times New Roman" panose="02020603050405020304" pitchFamily="18" charset="0"/>
-                <a:cs typeface="Times New Roman" panose="02020603050405020304" pitchFamily="18" charset="0"/>
-              </a:rPr>
-              <a:t>Print 2d Matrix Array – Multi- Dimensional</a:t>
-            </a:r>
-            <a:endParaRPr lang="en-IN" dirty="0">
-              <a:latin typeface="Times New Roman" panose="02020603050405020304" pitchFamily="18" charset="0"/>
-              <a:cs typeface="Times New Roman" panose="02020603050405020304" pitchFamily="18" charset="0"/>
-            </a:endParaRPr>
+              <a:t>This null terminator is crucial as it signals the end of the string, allowing functions to know where the string ends.</a:t>
+            </a:r>
+          </a:p>
+          <a:p>
+            <a:r>
+              <a:rPr lang="en-IN" dirty="0">
+                <a:latin typeface="Times New Roman" panose="02020603050405020304" pitchFamily="18" charset="0"/>
+                <a:cs typeface="Times New Roman" panose="02020603050405020304" pitchFamily="18" charset="0"/>
+              </a:rPr>
+              <a:t>char </a:t>
+            </a:r>
+            <a:r>
+              <a:rPr lang="en-IN" dirty="0" err="1">
+                <a:latin typeface="Times New Roman" panose="02020603050405020304" pitchFamily="18" charset="0"/>
+                <a:cs typeface="Times New Roman" panose="02020603050405020304" pitchFamily="18" charset="0"/>
+              </a:rPr>
+              <a:t>str_array</a:t>
+            </a:r>
+            <a:r>
+              <a:rPr lang="en-IN" dirty="0">
+                <a:latin typeface="Times New Roman" panose="02020603050405020304" pitchFamily="18" charset="0"/>
+                <a:cs typeface="Times New Roman" panose="02020603050405020304" pitchFamily="18" charset="0"/>
+              </a:rPr>
+              <a:t>[] = "Hello";</a:t>
+            </a:r>
           </a:p>
         </p:txBody>
       </p:sp>
     </p:spTree>
     <p:extLst>
       <p:ext uri="{BB962C8B-B14F-4D97-AF65-F5344CB8AC3E}">
-        <p14:creationId xmlns:p14="http://schemas.microsoft.com/office/powerpoint/2010/main" val="439685860"/>
+        <p14:creationId xmlns:p14="http://schemas.microsoft.com/office/powerpoint/2010/main" val="2128554438"/>
       </p:ext>
     </p:extLst>
   </p:cSld>
@@ -5746,315 +5577,6 @@
 </file>
 
 <file path=ppt/slides/slide20.xml><?xml version="1.0" encoding="utf-8"?>
-<p:sld xmlns:a="http://schemas.openxmlformats.org/drawingml/2006/main" xmlns:r="http://schemas.openxmlformats.org/officeDocument/2006/relationships" xmlns:p="http://schemas.openxmlformats.org/presentationml/2006/main">
-  <p:cSld>
-    <p:spTree>
-      <p:nvGrpSpPr>
-        <p:cNvPr id="1" name="">
-          <a:extLst>
-            <a:ext uri="{FF2B5EF4-FFF2-40B4-BE49-F238E27FC236}">
-              <a16:creationId xmlns:a16="http://schemas.microsoft.com/office/drawing/2014/main" id="{4F781140-F5AE-0546-7E17-8640A4B22960}"/>
-            </a:ext>
-          </a:extLst>
-        </p:cNvPr>
-        <p:cNvGrpSpPr/>
-        <p:nvPr/>
-      </p:nvGrpSpPr>
-      <p:grpSpPr>
-        <a:xfrm>
-          <a:off x="0" y="0"/>
-          <a:ext cx="0" cy="0"/>
-          <a:chOff x="0" y="0"/>
-          <a:chExt cx="0" cy="0"/>
-        </a:xfrm>
-      </p:grpSpPr>
-      <p:sp>
-        <p:nvSpPr>
-          <p:cNvPr id="2" name="Title 1">
-            <a:extLst>
-              <a:ext uri="{FF2B5EF4-FFF2-40B4-BE49-F238E27FC236}">
-                <a16:creationId xmlns:a16="http://schemas.microsoft.com/office/drawing/2014/main" id="{0308CA2A-8F7E-ABBF-B17A-2A102FEA21A6}"/>
-              </a:ext>
-            </a:extLst>
-          </p:cNvPr>
-          <p:cNvSpPr>
-            <a:spLocks noGrp="1"/>
-          </p:cNvSpPr>
-          <p:nvPr>
-            <p:ph type="ctrTitle"/>
-          </p:nvPr>
-        </p:nvSpPr>
-        <p:spPr>
-          <a:xfrm>
-            <a:off x="1809135" y="1041400"/>
-            <a:ext cx="9144000" cy="2387600"/>
-          </a:xfrm>
-        </p:spPr>
-        <p:txBody>
-          <a:bodyPr/>
-          <a:lstStyle/>
-          <a:p>
-            <a:r>
-              <a:rPr lang="en-US" dirty="0">
-                <a:solidFill>
-                  <a:srgbClr val="FF0000"/>
-                </a:solidFill>
-                <a:latin typeface="Times New Roman" panose="02020603050405020304" pitchFamily="18" charset="0"/>
-                <a:cs typeface="Times New Roman" panose="02020603050405020304" pitchFamily="18" charset="0"/>
-              </a:rPr>
-              <a:t>PROGRAMMING IN C	</a:t>
-            </a:r>
-            <a:endParaRPr lang="en-IN" dirty="0">
-              <a:solidFill>
-                <a:srgbClr val="FF0000"/>
-              </a:solidFill>
-              <a:latin typeface="Times New Roman" panose="02020603050405020304" pitchFamily="18" charset="0"/>
-              <a:cs typeface="Times New Roman" panose="02020603050405020304" pitchFamily="18" charset="0"/>
-            </a:endParaRPr>
-          </a:p>
-        </p:txBody>
-      </p:sp>
-      <p:sp>
-        <p:nvSpPr>
-          <p:cNvPr id="3" name="Subtitle 2">
-            <a:extLst>
-              <a:ext uri="{FF2B5EF4-FFF2-40B4-BE49-F238E27FC236}">
-                <a16:creationId xmlns:a16="http://schemas.microsoft.com/office/drawing/2014/main" id="{CFD2C0DF-F7BC-8729-2930-5C1165E77464}"/>
-              </a:ext>
-            </a:extLst>
-          </p:cNvPr>
-          <p:cNvSpPr>
-            <a:spLocks noGrp="1"/>
-          </p:cNvSpPr>
-          <p:nvPr>
-            <p:ph type="subTitle" idx="1"/>
-          </p:nvPr>
-        </p:nvSpPr>
-        <p:spPr>
-          <a:xfrm>
-            <a:off x="614516" y="3429000"/>
-            <a:ext cx="10962967" cy="1854865"/>
-          </a:xfrm>
-        </p:spPr>
-        <p:txBody>
-          <a:bodyPr>
-            <a:normAutofit fontScale="85000" lnSpcReduction="20000"/>
-          </a:bodyPr>
-          <a:lstStyle/>
-          <a:p>
-            <a:r>
-              <a:rPr lang="en-US" dirty="0"/>
-              <a:t>MODULE 2</a:t>
-            </a:r>
-          </a:p>
-          <a:p>
-            <a:pPr algn="just"/>
-            <a:r>
-              <a:rPr lang="en-US" dirty="0"/>
-              <a:t>Summarize the definition, initialization and accessing of single and multi dimensional arrays, Develop programs using single and multidimensional arrays, Illustrate the concept of divide and conquer method in solving problems, Develop C programs to implement searching (linear search and binary search) and sorting (selection sort and quicksort) algorithms. </a:t>
-            </a:r>
-            <a:r>
-              <a:rPr lang="en-US" dirty="0">
-                <a:solidFill>
-                  <a:srgbClr val="00B050"/>
-                </a:solidFill>
-              </a:rPr>
-              <a:t>Explain the representation of strings in C</a:t>
-            </a:r>
-            <a:r>
-              <a:rPr lang="en-US" dirty="0">
-                <a:solidFill>
-                  <a:schemeClr val="bg2">
-                    <a:lumMod val="10000"/>
-                  </a:schemeClr>
-                </a:solidFill>
-              </a:rPr>
-              <a:t>, </a:t>
-            </a:r>
-            <a:r>
-              <a:rPr lang="en-US" dirty="0">
-                <a:solidFill>
-                  <a:srgbClr val="00B050"/>
-                </a:solidFill>
-              </a:rPr>
-              <a:t>Develop C programs to perform different operations on strings</a:t>
-            </a:r>
-            <a:r>
-              <a:rPr lang="en-US" dirty="0">
-                <a:solidFill>
-                  <a:schemeClr val="bg2">
-                    <a:lumMod val="10000"/>
-                  </a:schemeClr>
-                </a:solidFill>
-              </a:rPr>
-              <a:t>, Illustrate passing arrays as parameters to a function.</a:t>
-            </a:r>
-            <a:endParaRPr lang="en-IN" dirty="0">
-              <a:solidFill>
-                <a:schemeClr val="bg2">
-                  <a:lumMod val="10000"/>
-                </a:schemeClr>
-              </a:solidFill>
-            </a:endParaRPr>
-          </a:p>
-        </p:txBody>
-      </p:sp>
-    </p:spTree>
-    <p:extLst>
-      <p:ext uri="{BB962C8B-B14F-4D97-AF65-F5344CB8AC3E}">
-        <p14:creationId xmlns:p14="http://schemas.microsoft.com/office/powerpoint/2010/main" val="1921615921"/>
-      </p:ext>
-    </p:extLst>
-  </p:cSld>
-  <p:clrMapOvr>
-    <a:masterClrMapping/>
-  </p:clrMapOvr>
-</p:sld>
-</file>
-
-<file path=ppt/slides/slide21.xml><?xml version="1.0" encoding="utf-8"?>
-<p:sld xmlns:a="http://schemas.openxmlformats.org/drawingml/2006/main" xmlns:r="http://schemas.openxmlformats.org/officeDocument/2006/relationships" xmlns:p="http://schemas.openxmlformats.org/presentationml/2006/main">
-  <p:cSld>
-    <p:spTree>
-      <p:nvGrpSpPr>
-        <p:cNvPr id="1" name=""/>
-        <p:cNvGrpSpPr/>
-        <p:nvPr/>
-      </p:nvGrpSpPr>
-      <p:grpSpPr>
-        <a:xfrm>
-          <a:off x="0" y="0"/>
-          <a:ext cx="0" cy="0"/>
-          <a:chOff x="0" y="0"/>
-          <a:chExt cx="0" cy="0"/>
-        </a:xfrm>
-      </p:grpSpPr>
-      <p:sp>
-        <p:nvSpPr>
-          <p:cNvPr id="2" name="Title 1">
-            <a:extLst>
-              <a:ext uri="{FF2B5EF4-FFF2-40B4-BE49-F238E27FC236}">
-                <a16:creationId xmlns:a16="http://schemas.microsoft.com/office/drawing/2014/main" id="{1EC6F273-FDA1-57CE-8DAB-4F45CEBF9322}"/>
-              </a:ext>
-            </a:extLst>
-          </p:cNvPr>
-          <p:cNvSpPr>
-            <a:spLocks noGrp="1"/>
-          </p:cNvSpPr>
-          <p:nvPr>
-            <p:ph type="title"/>
-          </p:nvPr>
-        </p:nvSpPr>
-        <p:spPr/>
-        <p:txBody>
-          <a:bodyPr/>
-          <a:lstStyle/>
-          <a:p>
-            <a:pPr algn="ctr"/>
-            <a:r>
-              <a:rPr lang="en-US" b="1" dirty="0">
-                <a:latin typeface="Times New Roman" panose="02020603050405020304" pitchFamily="18" charset="0"/>
-                <a:cs typeface="Times New Roman" panose="02020603050405020304" pitchFamily="18" charset="0"/>
-              </a:rPr>
-              <a:t>String	</a:t>
-            </a:r>
-            <a:endParaRPr lang="en-IN" b="1" dirty="0">
-              <a:latin typeface="Times New Roman" panose="02020603050405020304" pitchFamily="18" charset="0"/>
-              <a:cs typeface="Times New Roman" panose="02020603050405020304" pitchFamily="18" charset="0"/>
-            </a:endParaRPr>
-          </a:p>
-        </p:txBody>
-      </p:sp>
-      <p:sp>
-        <p:nvSpPr>
-          <p:cNvPr id="3" name="Content Placeholder 2">
-            <a:extLst>
-              <a:ext uri="{FF2B5EF4-FFF2-40B4-BE49-F238E27FC236}">
-                <a16:creationId xmlns:a16="http://schemas.microsoft.com/office/drawing/2014/main" id="{6DB22EC7-714F-95A5-85AC-47F8D33F4077}"/>
-              </a:ext>
-            </a:extLst>
-          </p:cNvPr>
-          <p:cNvSpPr>
-            <a:spLocks noGrp="1"/>
-          </p:cNvSpPr>
-          <p:nvPr>
-            <p:ph idx="1"/>
-          </p:nvPr>
-        </p:nvSpPr>
-        <p:spPr/>
-        <p:txBody>
-          <a:bodyPr/>
-          <a:lstStyle/>
-          <a:p>
-            <a:r>
-              <a:rPr lang="en-US" dirty="0">
-                <a:latin typeface="Times New Roman" panose="02020603050405020304" pitchFamily="18" charset="0"/>
-                <a:cs typeface="Times New Roman" panose="02020603050405020304" pitchFamily="18" charset="0"/>
-              </a:rPr>
-              <a:t>String is a sequence of characters  stored in a 	contiguous block of memory and terminated by a </a:t>
-            </a:r>
-            <a:r>
-              <a:rPr lang="en-US" dirty="0">
-                <a:solidFill>
-                  <a:schemeClr val="tx2">
-                    <a:lumMod val="50000"/>
-                    <a:lumOff val="50000"/>
-                  </a:schemeClr>
-                </a:solidFill>
-                <a:latin typeface="Times New Roman" panose="02020603050405020304" pitchFamily="18" charset="0"/>
-                <a:cs typeface="Times New Roman" panose="02020603050405020304" pitchFamily="18" charset="0"/>
-              </a:rPr>
-              <a:t>null character(‘\0’).</a:t>
-            </a:r>
-          </a:p>
-          <a:p>
-            <a:r>
-              <a:rPr lang="en-US" dirty="0">
-                <a:latin typeface="Times New Roman" panose="02020603050405020304" pitchFamily="18" charset="0"/>
-                <a:cs typeface="Times New Roman" panose="02020603050405020304" pitchFamily="18" charset="0"/>
-              </a:rPr>
-              <a:t>This null terminator is crucial as it signals the end of the string, allowing functions to know where the string ends.</a:t>
-            </a:r>
-          </a:p>
-          <a:p>
-            <a:r>
-              <a:rPr lang="en-IN" dirty="0">
-                <a:latin typeface="Times New Roman" panose="02020603050405020304" pitchFamily="18" charset="0"/>
-                <a:cs typeface="Times New Roman" panose="02020603050405020304" pitchFamily="18" charset="0"/>
-              </a:rPr>
-              <a:t>char </a:t>
-            </a:r>
-            <a:r>
-              <a:rPr lang="en-IN" dirty="0" err="1">
-                <a:latin typeface="Times New Roman" panose="02020603050405020304" pitchFamily="18" charset="0"/>
-                <a:cs typeface="Times New Roman" panose="02020603050405020304" pitchFamily="18" charset="0"/>
-              </a:rPr>
-              <a:t>str_array</a:t>
-            </a:r>
-            <a:r>
-              <a:rPr lang="en-IN" dirty="0">
-                <a:latin typeface="Times New Roman" panose="02020603050405020304" pitchFamily="18" charset="0"/>
-                <a:cs typeface="Times New Roman" panose="02020603050405020304" pitchFamily="18" charset="0"/>
-              </a:rPr>
-              <a:t>[] = "Hello";</a:t>
-            </a:r>
-          </a:p>
-        </p:txBody>
-      </p:sp>
-    </p:spTree>
-    <p:extLst>
-      <p:ext uri="{BB962C8B-B14F-4D97-AF65-F5344CB8AC3E}">
-        <p14:creationId xmlns:p14="http://schemas.microsoft.com/office/powerpoint/2010/main" val="2128554438"/>
-      </p:ext>
-    </p:extLst>
-  </p:cSld>
-  <p:clrMapOvr>
-    <a:masterClrMapping/>
-  </p:clrMapOvr>
-</p:sld>
-</file>
-
-<file path=ppt/slides/slide22.xml><?xml version="1.0" encoding="utf-8"?>
 <p:sld xmlns:a="http://schemas.openxmlformats.org/drawingml/2006/main" xmlns:r="http://schemas.openxmlformats.org/officeDocument/2006/relationships" xmlns:p="http://schemas.openxmlformats.org/presentationml/2006/main">
   <p:cSld>
     <p:spTree>
@@ -6577,7 +6099,7 @@
                 <a:latin typeface="Times New Roman" panose="02020603050405020304" pitchFamily="18" charset="0"/>
                 <a:cs typeface="Times New Roman" panose="02020603050405020304" pitchFamily="18" charset="0"/>
               </a:rPr>
-              <a:t> This is the simplest type, functioning as a linear list or vector of elements. It requires a single subscript to access its elements.</a:t>
+              <a:t> This is the simplest type, functioning as a linear list. It requires a single subscript to access its elements.</a:t>
             </a:r>
           </a:p>
           <a:p>
@@ -7216,7 +6738,7 @@
                 <a:latin typeface="Times New Roman" panose="02020603050405020304" pitchFamily="18" charset="0"/>
                 <a:cs typeface="Times New Roman" panose="02020603050405020304" pitchFamily="18" charset="0"/>
               </a:rPr>
-              <a:t>		char city = "Delhi";.</a:t>
+              <a:t>		char city[5] = "Delhi";.</a:t>
             </a:r>
             <a:endParaRPr lang="en-IN" b="1" dirty="0">
               <a:latin typeface="Times New Roman" panose="02020603050405020304" pitchFamily="18" charset="0"/>

</xml_diff>